<commit_message>
Add updated quanteda cheatsheet
</commit_message>
<xml_diff>
--- a/powerpoints/quanteda.pptx
+++ b/powerpoints/quanteda.pptx
@@ -107,36 +107,16 @@
 
 <file path=ppt/commentAuthors.xml><?xml version="1.0" encoding="utf-8"?>
 <p:cmAuthorLst xmlns:a="http://schemas.openxmlformats.org/drawingml/2006/main" xmlns:r="http://schemas.openxmlformats.org/officeDocument/2006/relationships" xmlns:p="http://schemas.openxmlformats.org/presentationml/2006/main">
-  <p:cmAuthor id="7" name="Benoit,KR" initials="B [7]" lastIdx="1" clrIdx="6">
-    <p:extLst/>
-  </p:cmAuthor>
-  <p:cmAuthor id="1" name="Benoit,KR" initials="B" lastIdx="1" clrIdx="0">
-    <p:extLst/>
-  </p:cmAuthor>
-  <p:cmAuthor id="8" name="Benoit,KR" initials="B [8]" lastIdx="1" clrIdx="7">
-    <p:extLst/>
-  </p:cmAuthor>
-  <p:cmAuthor id="2" name="Benoit,KR" initials="B [2]" lastIdx="1" clrIdx="1">
-    <p:extLst/>
-  </p:cmAuthor>
-  <p:cmAuthor id="9" name="Benoit,KR" initials="B [9]" lastIdx="1" clrIdx="8">
-    <p:extLst/>
-  </p:cmAuthor>
-  <p:cmAuthor id="3" name="Benoit,KR" initials="B [3]" lastIdx="1" clrIdx="2">
-    <p:extLst/>
-  </p:cmAuthor>
-  <p:cmAuthor id="10" name="Benoit,KR" initials="B [10]" lastIdx="1" clrIdx="9">
-    <p:extLst/>
-  </p:cmAuthor>
-  <p:cmAuthor id="4" name="Benoit,KR" initials="B [4]" lastIdx="1" clrIdx="3">
-    <p:extLst/>
-  </p:cmAuthor>
-  <p:cmAuthor id="5" name="Benoit,KR" initials="B [5]" lastIdx="1" clrIdx="4">
-    <p:extLst/>
-  </p:cmAuthor>
-  <p:cmAuthor id="6" name="Benoit,KR" initials="B [6]" lastIdx="1" clrIdx="5">
-    <p:extLst/>
-  </p:cmAuthor>
+  <p:cmAuthor id="7" name="Benoit,KR" initials="B [7]" lastIdx="1" clrIdx="6"/>
+  <p:cmAuthor id="1" name="Benoit,KR" initials="B" lastIdx="1" clrIdx="0"/>
+  <p:cmAuthor id="8" name="Benoit,KR" initials="B [8]" lastIdx="1" clrIdx="7"/>
+  <p:cmAuthor id="2" name="Benoit,KR" initials="B [2]" lastIdx="1" clrIdx="1"/>
+  <p:cmAuthor id="9" name="Benoit,KR" initials="B [9]" lastIdx="1" clrIdx="8"/>
+  <p:cmAuthor id="3" name="Benoit,KR" initials="B [3]" lastIdx="1" clrIdx="2"/>
+  <p:cmAuthor id="10" name="Benoit,KR" initials="B [10]" lastIdx="1" clrIdx="9"/>
+  <p:cmAuthor id="4" name="Benoit,KR" initials="B [4]" lastIdx="1" clrIdx="3"/>
+  <p:cmAuthor id="5" name="Benoit,KR" initials="B [5]" lastIdx="1" clrIdx="4"/>
+  <p:cmAuthor id="6" name="Benoit,KR" initials="B [6]" lastIdx="1" clrIdx="5"/>
 </p:cmAuthorLst>
 </file>
 
@@ -2114,8 +2094,8 @@
         </p:nvSpPr>
         <p:spPr>
           <a:xfrm>
-            <a:off x="3928502" y="1212238"/>
-            <a:ext cx="2966163" cy="2728346"/>
+            <a:off x="3831787" y="1212238"/>
+            <a:ext cx="3052773" cy="2728346"/>
           </a:xfrm>
           <a:prstGeom prst="rect">
             <a:avLst/>
@@ -2258,8 +2238,8 @@
         </p:nvSpPr>
         <p:spPr>
           <a:xfrm>
-            <a:off x="7137053" y="8064987"/>
-            <a:ext cx="6696000" cy="2305932"/>
+            <a:off x="7037878" y="8064987"/>
+            <a:ext cx="6840676" cy="2305932"/>
           </a:xfrm>
           <a:prstGeom prst="rect">
             <a:avLst/>
@@ -2328,7 +2308,7 @@
         </p:nvSpPr>
         <p:spPr>
           <a:xfrm>
-            <a:off x="262621" y="1712046"/>
+            <a:off x="288983" y="1607350"/>
             <a:ext cx="3503467" cy="2257028"/>
           </a:xfrm>
           <a:prstGeom prst="rect">
@@ -2514,23 +2494,7 @@
                 <a:ea typeface="Source Sans Pro" charset="0"/>
                 <a:cs typeface="Source Sans Pro" charset="0"/>
               </a:rPr>
-              <a:t>* fit (un-</a:t>
-            </a:r>
-            <a:r>
-              <a:rPr lang="en-US" sz="1400">
-                <a:latin typeface="Source Sans Pro" charset="0"/>
-                <a:ea typeface="Source Sans Pro" charset="0"/>
-                <a:cs typeface="Source Sans Pro" charset="0"/>
-              </a:rPr>
-              <a:t>)supervised </a:t>
-            </a:r>
-            <a:r>
-              <a:rPr lang="en-US" sz="1400" dirty="0">
-                <a:latin typeface="Source Sans Pro" charset="0"/>
-                <a:ea typeface="Source Sans Pro" charset="0"/>
-                <a:cs typeface="Source Sans Pro" charset="0"/>
-              </a:rPr>
-              <a:t>models</a:t>
+              <a:t>* fit (un-)supervised models</a:t>
             </a:r>
           </a:p>
           <a:p>
@@ -2677,7 +2641,7 @@
         </p:nvSpPr>
         <p:spPr>
           <a:xfrm>
-            <a:off x="3625144" y="154129"/>
+            <a:off x="3559271" y="192638"/>
             <a:ext cx="3511910" cy="536848"/>
           </a:xfrm>
           <a:prstGeom prst="rect">
@@ -2772,7 +2736,7 @@
         <p:spPr>
           <a:xfrm>
             <a:off x="520861" y="4738679"/>
-            <a:ext cx="6216624" cy="5996513"/>
+            <a:ext cx="6216624" cy="5457904"/>
           </a:xfrm>
           <a:prstGeom prst="rect">
             <a:avLst/>
@@ -3023,143 +2987,57 @@
           <a:p>
             <a:pPr algn="l"/>
             <a:r>
-              <a:rPr lang="en-US" sz="1000" dirty="0">
-                <a:latin typeface="Monaco" charset="0"/>
-                <a:ea typeface="Monaco" charset="0"/>
-                <a:cs typeface="Monaco" charset="0"/>
-              </a:rPr>
-              <a:t># Corpus consisting of 58 documents, showing 2 documents:</a:t>
+              <a:rPr lang="en-US" sz="900" dirty="0">
+                <a:latin typeface="Monaco" charset="0"/>
+                <a:ea typeface="Monaco" charset="0"/>
+                <a:cs typeface="Monaco" charset="0"/>
+              </a:rPr>
+              <a:t>## Corpus consisting of 58 documents, showing 2 documents:</a:t>
             </a:r>
           </a:p>
           <a:p>
             <a:pPr algn="l"/>
             <a:r>
-              <a:rPr lang="en-US" sz="1000" dirty="0">
-                <a:latin typeface="Monaco" charset="0"/>
-                <a:ea typeface="Monaco" charset="0"/>
-                <a:cs typeface="Monaco" charset="0"/>
-              </a:rPr>
-              <a:t>#            Text Types Tokens Sentences Year  President </a:t>
-            </a:r>
-            <a:r>
-              <a:rPr lang="en-US" sz="1000" dirty="0" err="1">
-                <a:latin typeface="Monaco" charset="0"/>
-                <a:ea typeface="Monaco" charset="0"/>
-                <a:cs typeface="Monaco" charset="0"/>
-              </a:rPr>
-              <a:t>FirstName</a:t>
-            </a:r>
-            <a:r>
-              <a:rPr lang="en-US" sz="1000" dirty="0">
-                <a:latin typeface="Monaco" charset="0"/>
-                <a:ea typeface="Monaco" charset="0"/>
-                <a:cs typeface="Monaco" charset="0"/>
-              </a:rPr>
-              <a:t> </a:t>
+              <a:rPr lang="en-US" sz="900" dirty="0">
+                <a:latin typeface="Monaco" charset="0"/>
+                <a:ea typeface="Monaco" charset="0"/>
+                <a:cs typeface="Monaco" charset="0"/>
+              </a:rPr>
+              <a:t>## </a:t>
             </a:r>
           </a:p>
           <a:p>
             <a:pPr algn="l"/>
             <a:r>
-              <a:rPr lang="en-US" sz="1000" dirty="0">
-                <a:latin typeface="Monaco" charset="0"/>
-                <a:ea typeface="Monaco" charset="0"/>
-                <a:cs typeface="Monaco" charset="0"/>
-              </a:rPr>
-              <a:t># 1789-Washington   625   1538        23 1789 Washington    George </a:t>
+              <a:rPr lang="en-US" sz="900" dirty="0">
+                <a:latin typeface="Monaco" charset="0"/>
+                <a:ea typeface="Monaco" charset="0"/>
+                <a:cs typeface="Monaco" charset="0"/>
+              </a:rPr>
+              <a:t>##             Text Types Tokens Sentences Year  President FirstName Party</a:t>
             </a:r>
           </a:p>
           <a:p>
             <a:pPr algn="l"/>
             <a:r>
-              <a:rPr lang="en-US" sz="1000" dirty="0">
-                <a:latin typeface="Monaco" charset="0"/>
-                <a:ea typeface="Monaco" charset="0"/>
-                <a:cs typeface="Monaco" charset="0"/>
-              </a:rPr>
-              <a:t># 1793-Washington    96    147         4 1793 Washington    George</a:t>
+              <a:rPr lang="en-US" sz="900" dirty="0">
+                <a:latin typeface="Monaco" charset="0"/>
+                <a:ea typeface="Monaco" charset="0"/>
+                <a:cs typeface="Monaco" charset="0"/>
+              </a:rPr>
+              <a:t>##  1789-Washington   625   1537        23 1789 Washington    George  none</a:t>
             </a:r>
           </a:p>
           <a:p>
             <a:pPr algn="l"/>
             <a:r>
-              <a:rPr lang="en-US" sz="1000" dirty="0">
-                <a:latin typeface="Monaco" charset="0"/>
-                <a:ea typeface="Monaco" charset="0"/>
-                <a:cs typeface="Monaco" charset="0"/>
-              </a:rPr>
-              <a:t>#</a:t>
-            </a:r>
-          </a:p>
-          <a:p>
-            <a:pPr algn="l"/>
-            <a:r>
-              <a:rPr lang="en-US" sz="1000" dirty="0">
-                <a:latin typeface="Monaco" charset="0"/>
-                <a:ea typeface="Monaco" charset="0"/>
-                <a:cs typeface="Monaco" charset="0"/>
-              </a:rPr>
-              <a:t># Source:  Gerhard Peters and John T. Woolley. The American Presidency Project.</a:t>
-            </a:r>
-          </a:p>
-          <a:p>
-            <a:pPr algn="l"/>
-            <a:r>
-              <a:rPr lang="en-US" sz="1000" dirty="0">
-                <a:latin typeface="Monaco" charset="0"/>
-                <a:ea typeface="Monaco" charset="0"/>
-                <a:cs typeface="Monaco" charset="0"/>
-              </a:rPr>
-              <a:t># Created: Tue Jun 13 14:51:47 2017</a:t>
-            </a:r>
-          </a:p>
-          <a:p>
-            <a:pPr algn="l"/>
-            <a:r>
-              <a:rPr lang="en-US" sz="1000" dirty="0">
-                <a:latin typeface="Monaco" charset="0"/>
-                <a:ea typeface="Monaco" charset="0"/>
-                <a:cs typeface="Monaco" charset="0"/>
-              </a:rPr>
-              <a:t># Notes:   http://</a:t>
-            </a:r>
-            <a:r>
-              <a:rPr lang="en-US" sz="1000" dirty="0" err="1">
-                <a:latin typeface="Monaco" charset="0"/>
-                <a:ea typeface="Monaco" charset="0"/>
-                <a:cs typeface="Monaco" charset="0"/>
-              </a:rPr>
-              <a:t>www.presidency.ucsb.edu</a:t>
-            </a:r>
-            <a:r>
-              <a:rPr lang="en-US" sz="1000" dirty="0">
-                <a:latin typeface="Monaco" charset="0"/>
-                <a:ea typeface="Monaco" charset="0"/>
-                <a:cs typeface="Monaco" charset="0"/>
-              </a:rPr>
-              <a:t>/</a:t>
-            </a:r>
-            <a:r>
-              <a:rPr lang="en-US" sz="1000" dirty="0" err="1">
-                <a:latin typeface="Monaco" charset="0"/>
-                <a:ea typeface="Monaco" charset="0"/>
-                <a:cs typeface="Monaco" charset="0"/>
-              </a:rPr>
-              <a:t>inaugurals.php</a:t>
-            </a:r>
-            <a:r>
-              <a:rPr lang="en-US" sz="1000" dirty="0">
-                <a:latin typeface="Monaco" charset="0"/>
-                <a:ea typeface="Monaco" charset="0"/>
-                <a:cs typeface="Monaco" charset="0"/>
-              </a:rPr>
-              <a:t> </a:t>
-            </a:r>
-            <a:endParaRPr lang="en-US" sz="1000" b="1" dirty="0">
-              <a:latin typeface="Source Sans Pro" charset="0"/>
-              <a:ea typeface="Source Sans Pro" charset="0"/>
-              <a:cs typeface="Source Sans Pro" charset="0"/>
-            </a:endParaRPr>
+              <a:rPr lang="en-US" sz="900" dirty="0">
+                <a:latin typeface="Monaco" charset="0"/>
+                <a:ea typeface="Monaco" charset="0"/>
+                <a:cs typeface="Monaco" charset="0"/>
+              </a:rPr>
+              <a:t>##  1793-Washington    96    147         4 1793 Washington    George  none</a:t>
+            </a:r>
           </a:p>
           <a:p>
             <a:pPr algn="l">
@@ -3185,7 +3063,7 @@
             <a:r>
               <a:rPr lang="en-US" sz="1300" dirty="0">
                 <a:solidFill>
-                  <a:srgbClr val="006AC7"/>
+                  <a:schemeClr val="tx1"/>
                 </a:solidFill>
                 <a:latin typeface="Monaco" charset="0"/>
                 <a:ea typeface="Monaco" charset="0"/>
@@ -3196,37 +3074,13 @@
             <a:r>
               <a:rPr lang="en-US" sz="1300" dirty="0" err="1">
                 <a:solidFill>
-                  <a:srgbClr val="006AC7"/>
-                </a:solidFill>
-                <a:latin typeface="Monaco" charset="0"/>
-                <a:ea typeface="Monaco" charset="0"/>
-                <a:cs typeface="Monaco" charset="0"/>
-              </a:rPr>
-              <a:t>docvars</a:t>
-            </a:r>
-            <a:r>
-              <a:rPr lang="en-US" sz="1300" dirty="0">
-                <a:latin typeface="Monaco" charset="0"/>
-                <a:ea typeface="Monaco" charset="0"/>
-                <a:cs typeface="Monaco" charset="0"/>
-              </a:rPr>
-              <a:t>(</a:t>
-            </a:r>
-            <a:r>
-              <a:rPr lang="en-US" sz="1300" dirty="0" err="1">
-                <a:latin typeface="Monaco" charset="0"/>
-                <a:ea typeface="Monaco" charset="0"/>
-                <a:cs typeface="Monaco" charset="0"/>
-              </a:rPr>
-              <a:t>data_corpus_inaugural</a:t>
-            </a:r>
-            <a:r>
-              <a:rPr lang="en-US" sz="1300" dirty="0">
-                <a:latin typeface="Monaco" charset="0"/>
-                <a:ea typeface="Monaco" charset="0"/>
-                <a:cs typeface="Monaco" charset="0"/>
-              </a:rPr>
-              <a:t>, "Party")</a:t>
+                  <a:schemeClr val="tx1"/>
+                </a:solidFill>
+                <a:latin typeface="Monaco" charset="0"/>
+                <a:ea typeface="Monaco" charset="0"/>
+                <a:cs typeface="Monaco" charset="0"/>
+              </a:rPr>
+              <a:t>data_corpus_inaugural$Party</a:t>
             </a:r>
             <a:br>
               <a:rPr lang="en-US" sz="1300" dirty="0">
@@ -3237,9 +3091,61 @@
             </a:br>
             <a:r>
               <a:rPr lang="en-US" sz="1300" dirty="0" err="1">
-                <a:solidFill>
-                  <a:srgbClr val="006AC7"/>
-                </a:solidFill>
+                <a:latin typeface="Monaco" charset="0"/>
+                <a:ea typeface="Monaco" charset="0"/>
+                <a:cs typeface="Monaco" charset="0"/>
+              </a:rPr>
+              <a:t>x$serial_number</a:t>
+            </a:r>
+            <a:r>
+              <a:rPr lang="en-US" sz="1300" dirty="0">
+                <a:latin typeface="Monaco" charset="0"/>
+                <a:ea typeface="Monaco" charset="0"/>
+                <a:cs typeface="Monaco" charset="0"/>
+              </a:rPr>
+              <a:t> &lt;- </a:t>
+            </a:r>
+            <a:r>
+              <a:rPr lang="en-US" sz="1300" dirty="0" err="1">
+                <a:latin typeface="Monaco" charset="0"/>
+                <a:ea typeface="Monaco" charset="0"/>
+                <a:cs typeface="Monaco" charset="0"/>
+              </a:rPr>
+              <a:t>seq_len</a:t>
+            </a:r>
+            <a:r>
+              <a:rPr lang="en-US" sz="1300" dirty="0">
+                <a:latin typeface="Monaco" charset="0"/>
+                <a:ea typeface="Monaco" charset="0"/>
+                <a:cs typeface="Monaco" charset="0"/>
+              </a:rPr>
+              <a:t>(</a:t>
+            </a:r>
+            <a:r>
+              <a:rPr lang="en-US" sz="1300" dirty="0" err="1">
+                <a:latin typeface="Monaco" charset="0"/>
+                <a:ea typeface="Monaco" charset="0"/>
+                <a:cs typeface="Monaco" charset="0"/>
+              </a:rPr>
+              <a:t>ndoc</a:t>
+            </a:r>
+            <a:r>
+              <a:rPr lang="en-US" sz="1300" dirty="0">
+                <a:latin typeface="Monaco" charset="0"/>
+                <a:ea typeface="Monaco" charset="0"/>
+                <a:cs typeface="Monaco" charset="0"/>
+              </a:rPr>
+              <a:t>(x))</a:t>
+            </a:r>
+            <a:br>
+              <a:rPr lang="en-US" sz="1300" dirty="0">
+                <a:latin typeface="Monaco" charset="0"/>
+                <a:ea typeface="Monaco" charset="0"/>
+                <a:cs typeface="Monaco" charset="0"/>
+              </a:rPr>
+            </a:br>
+            <a:r>
+              <a:rPr lang="en-US" sz="1300" dirty="0" err="1">
                 <a:latin typeface="Monaco" charset="0"/>
                 <a:ea typeface="Monaco" charset="0"/>
                 <a:cs typeface="Monaco" charset="0"/>
@@ -3248,9 +3154,6 @@
             </a:r>
             <a:r>
               <a:rPr lang="en-US" sz="1300" dirty="0">
-                <a:solidFill>
-                  <a:schemeClr val="tx1"/>
-                </a:solidFill>
                 <a:latin typeface="Monaco" charset="0"/>
                 <a:ea typeface="Monaco" charset="0"/>
                 <a:cs typeface="Monaco" charset="0"/>
@@ -3259,9 +3162,6 @@
             </a:r>
             <a:r>
               <a:rPr lang="en-US" sz="1300" dirty="0" err="1">
-                <a:solidFill>
-                  <a:schemeClr val="tx1"/>
-                </a:solidFill>
                 <a:latin typeface="Monaco" charset="0"/>
                 <a:ea typeface="Monaco" charset="0"/>
                 <a:cs typeface="Monaco" charset="0"/>
@@ -3270,22 +3170,51 @@
             </a:r>
             <a:r>
               <a:rPr lang="en-US" sz="1300" dirty="0">
-                <a:solidFill>
-                  <a:schemeClr val="tx1"/>
-                </a:solidFill>
-                <a:latin typeface="Monaco" charset="0"/>
-                <a:ea typeface="Monaco" charset="0"/>
-                <a:cs typeface="Monaco" charset="0"/>
-              </a:rPr>
-              <a:t>") &lt;- 1:ndoc(x)</a:t>
+                <a:latin typeface="Monaco" charset="0"/>
+                <a:ea typeface="Monaco" charset="0"/>
+                <a:cs typeface="Monaco" charset="0"/>
+              </a:rPr>
+              <a:t>") &lt;- </a:t>
+            </a:r>
+            <a:r>
+              <a:rPr lang="en-US" sz="1300" dirty="0" err="1">
+                <a:latin typeface="Monaco" charset="0"/>
+                <a:ea typeface="Monaco" charset="0"/>
+                <a:cs typeface="Monaco" charset="0"/>
+              </a:rPr>
+              <a:t>seq_len</a:t>
+            </a:r>
+            <a:r>
+              <a:rPr lang="en-US" sz="1300" dirty="0">
+                <a:latin typeface="Monaco" charset="0"/>
+                <a:ea typeface="Monaco" charset="0"/>
+                <a:cs typeface="Monaco" charset="0"/>
+              </a:rPr>
+              <a:t>(</a:t>
+            </a:r>
+            <a:r>
+              <a:rPr lang="en-US" sz="1300" dirty="0" err="1">
+                <a:latin typeface="Monaco" charset="0"/>
+                <a:ea typeface="Monaco" charset="0"/>
+                <a:cs typeface="Monaco" charset="0"/>
+              </a:rPr>
+              <a:t>ndoc</a:t>
+            </a:r>
+            <a:r>
+              <a:rPr lang="en-US" sz="1300" dirty="0">
+                <a:latin typeface="Monaco" charset="0"/>
+                <a:ea typeface="Monaco" charset="0"/>
+                <a:cs typeface="Monaco" charset="0"/>
+              </a:rPr>
+              <a:t>(x)) # alternative</a:t>
             </a:r>
             <a:endParaRPr lang="en-US" sz="1300" dirty="0">
               <a:solidFill>
-                <a:schemeClr val="tx1"/>
+                <a:srgbClr val="006AC7"/>
               </a:solidFill>
-              <a:latin typeface="Source Sans Pro" charset="0"/>
-              <a:ea typeface="Source Sans Pro" charset="0"/>
-              <a:cs typeface="Source Sans Pro" charset="0"/>
+              <a:latin typeface="Monaco" charset="0"/>
+              <a:ea typeface="Monaco" charset="0"/>
+              <a:cs typeface="Monaco" charset="0"/>
             </a:endParaRPr>
           </a:p>
           <a:p>
@@ -3429,7 +3358,7 @@
                 <a:ea typeface="Monaco" charset="0"/>
                 <a:cs typeface="Monaco" charset="0"/>
               </a:rPr>
-              <a:t>(x, to = c("sentences", "paragraphs"))</a:t>
+              <a:t>(x, to = "sentences")</a:t>
             </a:r>
           </a:p>
           <a:p>
@@ -3583,8 +3512,8 @@
         </p:nvSpPr>
         <p:spPr>
           <a:xfrm>
-            <a:off x="229085" y="4049688"/>
-            <a:ext cx="6655475" cy="486431"/>
+            <a:off x="234138" y="4049688"/>
+            <a:ext cx="6650422" cy="486431"/>
           </a:xfrm>
           <a:prstGeom prst="roundRect">
             <a:avLst>
@@ -3666,8 +3595,8 @@
         </p:nvSpPr>
         <p:spPr>
           <a:xfrm>
-            <a:off x="7352820" y="639097"/>
-            <a:ext cx="6645071" cy="7083991"/>
+            <a:off x="7153641" y="554077"/>
+            <a:ext cx="6743492" cy="7360989"/>
           </a:xfrm>
           <a:prstGeom prst="rect">
             <a:avLst/>
@@ -3856,7 +3785,7 @@
                 <a:ea typeface="Monaco" charset="0"/>
                 <a:cs typeface="Monaco" charset="0"/>
               </a:rPr>
-              <a:t>head</a:t>
+              <a:t>print</a:t>
             </a:r>
             <a:r>
               <a:rPr lang="de-DE" sz="1300" dirty="0">
@@ -3872,7 +3801,7 @@
                 <a:ea typeface="Monaco" charset="0"/>
                 <a:cs typeface="Monaco" charset="0"/>
               </a:rPr>
-              <a:t>n</a:t>
+              <a:t>max</a:t>
             </a:r>
             <a:r>
               <a:rPr lang="de-DE" sz="1300" dirty="0">
@@ -3880,6 +3809,22 @@
                 <a:ea typeface="Monaco" charset="0"/>
                 <a:cs typeface="Monaco" charset="0"/>
               </a:rPr>
+              <a:t>-_</a:t>
+            </a:r>
+            <a:r>
+              <a:rPr lang="de-DE" sz="1300" dirty="0" err="1">
+                <a:latin typeface="Monaco" charset="0"/>
+                <a:ea typeface="Monaco" charset="0"/>
+                <a:cs typeface="Monaco" charset="0"/>
+              </a:rPr>
+              <a:t>ndoc</a:t>
+            </a:r>
+            <a:r>
+              <a:rPr lang="de-DE" sz="1300" dirty="0">
+                <a:latin typeface="Monaco" charset="0"/>
+                <a:ea typeface="Monaco" charset="0"/>
+                <a:cs typeface="Monaco" charset="0"/>
+              </a:rPr>
               <a:t> = 2, </a:t>
             </a:r>
             <a:r>
@@ -3888,7 +3833,7 @@
                 <a:ea typeface="Monaco" charset="0"/>
                 <a:cs typeface="Monaco" charset="0"/>
               </a:rPr>
-              <a:t>nf</a:t>
+              <a:t>max_nfeat</a:t>
             </a:r>
             <a:r>
               <a:rPr lang="de-DE" sz="1300" dirty="0">
@@ -3902,254 +3847,117 @@
           <a:p>
             <a:pPr lvl="0" algn="l"/>
             <a:r>
-              <a:rPr lang="mr-IN" sz="1000" dirty="0">
-                <a:latin typeface="Monaco" charset="0"/>
-                <a:ea typeface="Monaco" charset="0"/>
-                <a:cs typeface="Monaco" charset="0"/>
-              </a:rPr>
-              <a:t>## </a:t>
-            </a:r>
-            <a:r>
-              <a:rPr lang="mr-IN" sz="1000" dirty="0" err="1">
-                <a:latin typeface="Monaco" charset="0"/>
-                <a:ea typeface="Monaco" charset="0"/>
-                <a:cs typeface="Monaco" charset="0"/>
-              </a:rPr>
-              <a:t>Document-feature</a:t>
-            </a:r>
-            <a:r>
-              <a:rPr lang="mr-IN" sz="1000" dirty="0">
-                <a:latin typeface="Monaco" charset="0"/>
-                <a:ea typeface="Monaco" charset="0"/>
-                <a:cs typeface="Monaco" charset="0"/>
-              </a:rPr>
-              <a:t> </a:t>
-            </a:r>
-            <a:r>
-              <a:rPr lang="mr-IN" sz="1000" dirty="0" err="1">
-                <a:latin typeface="Monaco" charset="0"/>
-                <a:ea typeface="Monaco" charset="0"/>
-                <a:cs typeface="Monaco" charset="0"/>
-              </a:rPr>
-              <a:t>matrix</a:t>
-            </a:r>
-            <a:r>
-              <a:rPr lang="mr-IN" sz="1000" dirty="0">
-                <a:latin typeface="Monaco" charset="0"/>
-                <a:ea typeface="Monaco" charset="0"/>
-                <a:cs typeface="Monaco" charset="0"/>
-              </a:rPr>
-              <a:t> of: </a:t>
-            </a:r>
-            <a:r>
-              <a:rPr lang="de-DE" sz="1000" dirty="0">
-                <a:latin typeface="Monaco" charset="0"/>
-                <a:ea typeface="Monaco" charset="0"/>
-                <a:cs typeface="Monaco" charset="0"/>
-              </a:rPr>
-              <a:t>2</a:t>
-            </a:r>
-            <a:r>
-              <a:rPr lang="mr-IN" sz="1000" dirty="0">
-                <a:latin typeface="Monaco" charset="0"/>
-                <a:ea typeface="Monaco" charset="0"/>
-                <a:cs typeface="Monaco" charset="0"/>
-              </a:rPr>
-              <a:t> </a:t>
-            </a:r>
-            <a:r>
-              <a:rPr lang="mr-IN" sz="1000" dirty="0" err="1">
-                <a:latin typeface="Monaco" charset="0"/>
-                <a:ea typeface="Monaco" charset="0"/>
-                <a:cs typeface="Monaco" charset="0"/>
-              </a:rPr>
-              <a:t>documents</a:t>
-            </a:r>
-            <a:r>
-              <a:rPr lang="mr-IN" sz="1000" dirty="0">
-                <a:latin typeface="Monaco" charset="0"/>
-                <a:ea typeface="Monaco" charset="0"/>
-                <a:cs typeface="Monaco" charset="0"/>
-              </a:rPr>
-              <a:t>, 4 </a:t>
-            </a:r>
-            <a:r>
-              <a:rPr lang="mr-IN" sz="1000" dirty="0" err="1">
-                <a:latin typeface="Monaco" charset="0"/>
-                <a:ea typeface="Monaco" charset="0"/>
-                <a:cs typeface="Monaco" charset="0"/>
-              </a:rPr>
-              <a:t>features</a:t>
-            </a:r>
-            <a:r>
-              <a:rPr lang="mr-IN" sz="1000" dirty="0">
-                <a:latin typeface="Monaco" charset="0"/>
-                <a:ea typeface="Monaco" charset="0"/>
-                <a:cs typeface="Monaco" charset="0"/>
-              </a:rPr>
-              <a:t> (41.7% </a:t>
-            </a:r>
-            <a:r>
-              <a:rPr lang="mr-IN" sz="1000" dirty="0" err="1">
-                <a:latin typeface="Monaco" charset="0"/>
-                <a:ea typeface="Monaco" charset="0"/>
-                <a:cs typeface="Monaco" charset="0"/>
-              </a:rPr>
-              <a:t>sparse</a:t>
-            </a:r>
-            <a:r>
-              <a:rPr lang="mr-IN" sz="1000" dirty="0">
-                <a:latin typeface="Monaco" charset="0"/>
-                <a:ea typeface="Monaco" charset="0"/>
-                <a:cs typeface="Monaco" charset="0"/>
-              </a:rPr>
-              <a:t>).</a:t>
-            </a:r>
-            <a:endParaRPr lang="en-GB" sz="1000" dirty="0">
-              <a:latin typeface="Monaco" charset="0"/>
-              <a:ea typeface="Monaco" charset="0"/>
-              <a:cs typeface="Monaco" charset="0"/>
-            </a:endParaRPr>
+              <a:rPr lang="en-IE" sz="900" dirty="0">
+                <a:latin typeface="Monaco" charset="0"/>
+                <a:ea typeface="Monaco" charset="0"/>
+                <a:cs typeface="Monaco" charset="0"/>
+              </a:rPr>
+              <a:t>## Document-feature matrix of: 58 documents, 9,210 features (92.6% sparse) and 4 </a:t>
+            </a:r>
+            <a:r>
+              <a:rPr lang="en-IE" sz="900" dirty="0" err="1">
+                <a:latin typeface="Monaco" charset="0"/>
+                <a:ea typeface="Monaco" charset="0"/>
+                <a:cs typeface="Monaco" charset="0"/>
+              </a:rPr>
+              <a:t>docvars</a:t>
+            </a:r>
+            <a:r>
+              <a:rPr lang="en-IE" sz="900" dirty="0">
+                <a:latin typeface="Monaco" charset="0"/>
+                <a:ea typeface="Monaco" charset="0"/>
+                <a:cs typeface="Monaco" charset="0"/>
+              </a:rPr>
+              <a:t>.</a:t>
+            </a:r>
           </a:p>
           <a:p>
             <a:pPr lvl="0" algn="l"/>
             <a:r>
-              <a:rPr lang="mr-IN" sz="1000" dirty="0">
-                <a:latin typeface="Monaco" charset="0"/>
-                <a:ea typeface="Monaco" charset="0"/>
-                <a:cs typeface="Monaco" charset="0"/>
-              </a:rPr>
-              <a:t>##                  </a:t>
-            </a:r>
-            <a:r>
-              <a:rPr lang="mr-IN" sz="1000" dirty="0" err="1">
-                <a:latin typeface="Monaco" charset="0"/>
-                <a:ea typeface="Monaco" charset="0"/>
-                <a:cs typeface="Monaco" charset="0"/>
-              </a:rPr>
-              <a:t>features</a:t>
-            </a:r>
-            <a:endParaRPr lang="en-GB" sz="1000" dirty="0">
-              <a:latin typeface="Monaco" charset="0"/>
-              <a:ea typeface="Monaco" charset="0"/>
-              <a:cs typeface="Monaco" charset="0"/>
-            </a:endParaRPr>
+              <a:rPr lang="en-IE" sz="900" dirty="0">
+                <a:latin typeface="Monaco" charset="0"/>
+                <a:ea typeface="Monaco" charset="0"/>
+                <a:cs typeface="Monaco" charset="0"/>
+              </a:rPr>
+              <a:t>##                  features</a:t>
+            </a:r>
           </a:p>
           <a:p>
             <a:pPr lvl="0" algn="l"/>
             <a:r>
-              <a:rPr lang="mr-IN" sz="1000" dirty="0">
-                <a:latin typeface="Monaco" charset="0"/>
-                <a:ea typeface="Monaco" charset="0"/>
-                <a:cs typeface="Monaco" charset="0"/>
-              </a:rPr>
-              <a:t>## </a:t>
-            </a:r>
-            <a:r>
-              <a:rPr lang="mr-IN" sz="1000" dirty="0" err="1">
-                <a:latin typeface="Monaco" charset="0"/>
-                <a:ea typeface="Monaco" charset="0"/>
-                <a:cs typeface="Monaco" charset="0"/>
-              </a:rPr>
-              <a:t>docs</a:t>
-            </a:r>
-            <a:r>
-              <a:rPr lang="mr-IN" sz="1000" dirty="0">
-                <a:latin typeface="Monaco" charset="0"/>
-                <a:ea typeface="Monaco" charset="0"/>
-                <a:cs typeface="Monaco" charset="0"/>
-              </a:rPr>
-              <a:t>              </a:t>
-            </a:r>
-            <a:r>
-              <a:rPr lang="mr-IN" sz="1000" dirty="0" err="1">
-                <a:latin typeface="Monaco" charset="0"/>
-                <a:ea typeface="Monaco" charset="0"/>
-                <a:cs typeface="Monaco" charset="0"/>
-              </a:rPr>
-              <a:t>fellow-citizens</a:t>
-            </a:r>
-            <a:r>
-              <a:rPr lang="mr-IN" sz="1000" dirty="0">
-                <a:latin typeface="Monaco" charset="0"/>
-                <a:ea typeface="Monaco" charset="0"/>
-                <a:cs typeface="Monaco" charset="0"/>
-              </a:rPr>
-              <a:t> </a:t>
-            </a:r>
-            <a:r>
-              <a:rPr lang="mr-IN" sz="1000" dirty="0" err="1">
-                <a:latin typeface="Monaco" charset="0"/>
-                <a:ea typeface="Monaco" charset="0"/>
-                <a:cs typeface="Monaco" charset="0"/>
-              </a:rPr>
-              <a:t>senate</a:t>
-            </a:r>
-            <a:r>
-              <a:rPr lang="mr-IN" sz="1000" dirty="0">
-                <a:latin typeface="Monaco" charset="0"/>
-                <a:ea typeface="Monaco" charset="0"/>
-                <a:cs typeface="Monaco" charset="0"/>
-              </a:rPr>
-              <a:t> </a:t>
-            </a:r>
-            <a:r>
-              <a:rPr lang="mr-IN" sz="1000" dirty="0" err="1">
-                <a:latin typeface="Monaco" charset="0"/>
-                <a:ea typeface="Monaco" charset="0"/>
-                <a:cs typeface="Monaco" charset="0"/>
-              </a:rPr>
-              <a:t>house</a:t>
-            </a:r>
-            <a:r>
-              <a:rPr lang="mr-IN" sz="1000" dirty="0">
-                <a:latin typeface="Monaco" charset="0"/>
-                <a:ea typeface="Monaco" charset="0"/>
-                <a:cs typeface="Monaco" charset="0"/>
-              </a:rPr>
-              <a:t> </a:t>
-            </a:r>
-            <a:r>
-              <a:rPr lang="mr-IN" sz="1000" dirty="0" err="1">
-                <a:latin typeface="Monaco" charset="0"/>
-                <a:ea typeface="Monaco" charset="0"/>
-                <a:cs typeface="Monaco" charset="0"/>
-              </a:rPr>
-              <a:t>representatives</a:t>
-            </a:r>
-            <a:endParaRPr lang="en-GB" sz="1000" dirty="0">
-              <a:latin typeface="Monaco" charset="0"/>
-              <a:ea typeface="Monaco" charset="0"/>
-              <a:cs typeface="Monaco" charset="0"/>
-            </a:endParaRPr>
+              <a:rPr lang="en-IE" sz="900" dirty="0">
+                <a:latin typeface="Monaco" charset="0"/>
+                <a:ea typeface="Monaco" charset="0"/>
+                <a:cs typeface="Monaco" charset="0"/>
+              </a:rPr>
+              <a:t>## docs              fellow-citizens senate house representatives</a:t>
+            </a:r>
           </a:p>
           <a:p>
             <a:pPr lvl="0" algn="l"/>
             <a:r>
-              <a:rPr lang="mr-IN" sz="1000" dirty="0">
+              <a:rPr lang="en-IE" sz="900" dirty="0">
                 <a:latin typeface="Monaco" charset="0"/>
                 <a:ea typeface="Monaco" charset="0"/>
                 <a:cs typeface="Monaco" charset="0"/>
               </a:rPr>
               <a:t>##   1789-Washington               1      1     2               2</a:t>
             </a:r>
-            <a:endParaRPr lang="en-GB" sz="1000" dirty="0">
-              <a:latin typeface="Monaco" charset="0"/>
-              <a:ea typeface="Monaco" charset="0"/>
-              <a:cs typeface="Monaco" charset="0"/>
-            </a:endParaRPr>
           </a:p>
           <a:p>
             <a:pPr lvl="0" algn="l"/>
             <a:r>
-              <a:rPr lang="mr-IN" sz="1000" dirty="0">
+              <a:rPr lang="en-IE" sz="900" dirty="0">
                 <a:latin typeface="Monaco" charset="0"/>
                 <a:ea typeface="Monaco" charset="0"/>
                 <a:cs typeface="Monaco" charset="0"/>
               </a:rPr>
               <a:t>##   1793-Washington               0      0     0               0</a:t>
             </a:r>
-            <a:endParaRPr lang="en-GB" sz="1000" dirty="0">
+          </a:p>
+          <a:p>
+            <a:pPr lvl="0" algn="l"/>
+            <a:r>
+              <a:rPr lang="en-IE" sz="900" dirty="0">
+                <a:latin typeface="Monaco" charset="0"/>
+                <a:ea typeface="Monaco" charset="0"/>
+                <a:cs typeface="Monaco" charset="0"/>
+              </a:rPr>
+              <a:t>## [ reached </a:t>
+            </a:r>
+            <a:r>
+              <a:rPr lang="en-IE" sz="900" dirty="0" err="1">
+                <a:latin typeface="Monaco" charset="0"/>
+                <a:ea typeface="Monaco" charset="0"/>
+                <a:cs typeface="Monaco" charset="0"/>
+              </a:rPr>
+              <a:t>max_ndoc</a:t>
+            </a:r>
+            <a:r>
+              <a:rPr lang="en-IE" sz="900" dirty="0">
+                <a:latin typeface="Monaco" charset="0"/>
+                <a:ea typeface="Monaco" charset="0"/>
+                <a:cs typeface="Monaco" charset="0"/>
+              </a:rPr>
+              <a:t> ... 56 more documents, reached </a:t>
+            </a:r>
+            <a:r>
+              <a:rPr lang="en-IE" sz="900" dirty="0" err="1">
+                <a:latin typeface="Monaco" charset="0"/>
+                <a:ea typeface="Monaco" charset="0"/>
+                <a:cs typeface="Monaco" charset="0"/>
+              </a:rPr>
+              <a:t>max_nfeat</a:t>
+            </a:r>
+            <a:r>
+              <a:rPr lang="en-IE" sz="900" dirty="0">
+                <a:latin typeface="Monaco" charset="0"/>
+                <a:ea typeface="Monaco" charset="0"/>
+                <a:cs typeface="Monaco" charset="0"/>
+              </a:rPr>
+              <a:t> ... 9,206 more features ]</a:t>
+            </a:r>
+            <a:endParaRPr lang="en-GB" sz="900" dirty="0">
               <a:latin typeface="Monaco" charset="0"/>
               <a:ea typeface="Monaco" charset="0"/>
               <a:cs typeface="Monaco" charset="0"/>
@@ -4291,7 +4099,7 @@
                 <a:ea typeface="Monaco" charset="0"/>
                 <a:cs typeface="Monaco" charset="0"/>
               </a:rPr>
-              <a:t>(x, dictionary = data_dictionary_LSD2015)</a:t>
+              <a:t>(x, pattern = data_dictionary_LSD2015, selection = "keep")</a:t>
             </a:r>
           </a:p>
           <a:p>
@@ -4370,7 +4178,37 @@
                 <a:ea typeface="Monaco" charset="0"/>
                 <a:cs typeface="Monaco" charset="0"/>
               </a:rPr>
-              <a:t>(x, type = "prop") | </a:t>
+              <a:t>(x</a:t>
+            </a:r>
+            <a:r>
+              <a:rPr lang="en-GB" sz="1300" dirty="0">
+                <a:latin typeface="Monaco" pitchFamily="2" charset="77"/>
+                <a:ea typeface="Monaco" charset="0"/>
+                <a:cs typeface="Monaco" charset="0"/>
+              </a:rPr>
+              <a:t>, </a:t>
+            </a:r>
+            <a:r>
+              <a:rPr lang="en-IE" sz="1400" dirty="0">
+                <a:latin typeface="Monaco" pitchFamily="2" charset="77"/>
+              </a:rPr>
+              <a:t>scheme</a:t>
+            </a:r>
+            <a:r>
+              <a:rPr lang="en-GB" sz="1300" dirty="0">
+                <a:latin typeface="Monaco" pitchFamily="2" charset="77"/>
+                <a:ea typeface="Monaco" charset="0"/>
+                <a:cs typeface="Monaco" charset="0"/>
+              </a:rPr>
+              <a:t> = "prop") </a:t>
+            </a:r>
+            <a:r>
+              <a:rPr lang="en-GB" sz="1300" dirty="0">
+                <a:latin typeface="Monaco" charset="0"/>
+                <a:ea typeface="Monaco" charset="0"/>
+                <a:cs typeface="Monaco" charset="0"/>
+              </a:rPr>
+              <a:t>| </a:t>
             </a:r>
             <a:r>
               <a:rPr lang="en-GB" sz="1300" dirty="0" err="1">
@@ -4810,8 +4648,8 @@
         </p:nvSpPr>
         <p:spPr>
           <a:xfrm>
-            <a:off x="4023836" y="1697976"/>
-            <a:ext cx="3053316" cy="1938992"/>
+            <a:off x="3931008" y="1577042"/>
+            <a:ext cx="3053316" cy="2369880"/>
           </a:xfrm>
           <a:prstGeom prst="rect">
             <a:avLst/>
@@ -4868,6 +4706,33 @@
                 <a:ea typeface="Source Sans Pro" charset="0"/>
                 <a:cs typeface="Source Sans Pro" charset="0"/>
               </a:rPr>
+              <a:t>quanteda.textmodels</a:t>
+            </a:r>
+            <a:r>
+              <a:rPr lang="en-US" sz="1400" dirty="0">
+                <a:latin typeface="Source Sans Pro" charset="0"/>
+                <a:ea typeface="Source Sans Pro" charset="0"/>
+                <a:cs typeface="Source Sans Pro" charset="0"/>
+              </a:rPr>
+              <a:t>: Text scaling and classification models</a:t>
+            </a:r>
+            <a:endParaRPr lang="en-US" sz="1400" b="1" dirty="0">
+              <a:latin typeface="Source Sans Pro" charset="0"/>
+              <a:ea typeface="Source Sans Pro" charset="0"/>
+              <a:cs typeface="Source Sans Pro" charset="0"/>
+            </a:endParaRPr>
+          </a:p>
+          <a:p>
+            <a:pPr marL="171450" indent="-171450" algn="l">
+              <a:buFont typeface="Arial" charset="0"/>
+              <a:buChar char="•"/>
+            </a:pPr>
+            <a:r>
+              <a:rPr lang="en-US" sz="1400" b="1" dirty="0" err="1">
+                <a:latin typeface="Source Sans Pro" charset="0"/>
+                <a:ea typeface="Source Sans Pro" charset="0"/>
+                <a:cs typeface="Source Sans Pro" charset="0"/>
+              </a:rPr>
               <a:t>readtext</a:t>
             </a:r>
             <a:r>
@@ -4992,8 +4857,8 @@
         </p:nvSpPr>
         <p:spPr>
           <a:xfrm>
-            <a:off x="3928502" y="1052562"/>
-            <a:ext cx="2966164" cy="460830"/>
+            <a:off x="3831787" y="1052562"/>
+            <a:ext cx="3052774" cy="460830"/>
           </a:xfrm>
           <a:prstGeom prst="roundRect">
             <a:avLst>
@@ -5042,8 +4907,8 @@
         </p:nvSpPr>
         <p:spPr>
           <a:xfrm>
-            <a:off x="7103808" y="7804223"/>
-            <a:ext cx="6762683" cy="478998"/>
+            <a:off x="7009130" y="7804223"/>
+            <a:ext cx="6903234" cy="478998"/>
           </a:xfrm>
           <a:prstGeom prst="roundRect">
             <a:avLst>
@@ -5092,8 +4957,8 @@
         </p:nvSpPr>
         <p:spPr>
           <a:xfrm>
-            <a:off x="10555295" y="9585423"/>
-            <a:ext cx="3000271" cy="200055"/>
+            <a:off x="10510859" y="9585423"/>
+            <a:ext cx="3044708" cy="200055"/>
           </a:xfrm>
           <a:prstGeom prst="rect">
             <a:avLst/>
@@ -5130,8 +4995,8 @@
         </p:nvSpPr>
         <p:spPr>
           <a:xfrm>
-            <a:off x="7149245" y="141938"/>
-            <a:ext cx="6696000" cy="7444880"/>
+            <a:off x="7043041" y="272053"/>
+            <a:ext cx="6835513" cy="7424897"/>
           </a:xfrm>
           <a:prstGeom prst="rect">
             <a:avLst/>
@@ -5200,8 +5065,8 @@
         </p:nvSpPr>
         <p:spPr>
           <a:xfrm>
-            <a:off x="7110219" y="42189"/>
-            <a:ext cx="6771600" cy="491636"/>
+            <a:off x="7009130" y="42189"/>
+            <a:ext cx="6910791" cy="491636"/>
           </a:xfrm>
           <a:prstGeom prst="roundRect">
             <a:avLst>
@@ -5310,8 +5175,8 @@
         </p:nvSpPr>
         <p:spPr>
           <a:xfrm>
-            <a:off x="7340628" y="8337479"/>
-            <a:ext cx="5565144" cy="1926168"/>
+            <a:off x="7142151" y="8347979"/>
+            <a:ext cx="6306988" cy="1926168"/>
           </a:xfrm>
           <a:prstGeom prst="rect">
             <a:avLst/>
@@ -5405,7 +5270,7 @@
                 <a:ea typeface="Monaco" charset="0"/>
                 <a:cs typeface="Monaco" charset="0"/>
               </a:rPr>
-              <a:t>, "</a:t>
+              <a:t>, pattern = "</a:t>
             </a:r>
             <a:r>
               <a:rPr lang="en-US" sz="1300" dirty="0" err="1">
@@ -5481,10 +5346,26 @@
                 <a:ea typeface="Monaco" charset="0"/>
                 <a:cs typeface="Monaco" charset="0"/>
               </a:rPr>
-              <a:t>(corpus)			</a:t>
+              <a:t>(</a:t>
             </a:r>
             <a:r>
               <a:rPr lang="en-US" sz="1300" i="1" dirty="0">
+                <a:latin typeface="Monaco" charset="0"/>
+                <a:ea typeface="Monaco" charset="0"/>
+                <a:cs typeface="Monaco" charset="0"/>
+              </a:rPr>
+              <a:t>corpus</a:t>
+            </a:r>
+            <a:r>
+              <a:rPr lang="en-US" sz="1300" dirty="0">
+                <a:latin typeface="Monaco" charset="0"/>
+                <a:ea typeface="Monaco" charset="0"/>
+                <a:cs typeface="Monaco" charset="0"/>
+              </a:rPr>
+              <a:t>)			</a:t>
+            </a:r>
+            <a:r>
+              <a:rPr lang="en-US" sz="1300" i="1" dirty="0">
                 <a:latin typeface="Source Sans Pro" charset="0"/>
                 <a:ea typeface="Source Sans Pro" charset="0"/>
                 <a:cs typeface="Source Sans Pro" charset="0"/>
@@ -5511,10 +5392,112 @@
                 <a:ea typeface="Monaco" charset="0"/>
                 <a:cs typeface="Monaco" charset="0"/>
               </a:rPr>
-              <a:t>(corpus/</a:t>
-            </a:r>
+              <a:t>(</a:t>
+            </a:r>
+            <a:r>
+              <a:rPr lang="en-US" sz="1300" i="1" dirty="0">
+                <a:latin typeface="Monaco" charset="0"/>
+                <a:ea typeface="Monaco" charset="0"/>
+                <a:cs typeface="Monaco" charset="0"/>
+              </a:rPr>
+              <a:t>corpus </a:t>
+            </a:r>
+            <a:r>
+              <a:rPr lang="en-US" sz="1300" dirty="0">
+                <a:latin typeface="Monaco" charset="0"/>
+                <a:ea typeface="Monaco" charset="0"/>
+                <a:cs typeface="Monaco" charset="0"/>
+              </a:rPr>
+              <a:t>/</a:t>
+            </a:r>
+            <a:r>
+              <a:rPr lang="en-US" sz="1300" i="1" dirty="0" err="1">
+                <a:latin typeface="Monaco" charset="0"/>
+                <a:ea typeface="Monaco" charset="0"/>
+                <a:cs typeface="Monaco" charset="0"/>
+              </a:rPr>
+              <a:t>dfm</a:t>
+            </a:r>
+            <a:r>
+              <a:rPr lang="en-US" sz="1300" i="1" dirty="0">
+                <a:latin typeface="Monaco" charset="0"/>
+                <a:ea typeface="Monaco" charset="0"/>
+                <a:cs typeface="Monaco" charset="0"/>
+              </a:rPr>
+              <a:t> </a:t>
+            </a:r>
+            <a:r>
+              <a:rPr lang="en-US" sz="1300" dirty="0">
+                <a:latin typeface="Monaco" charset="0"/>
+                <a:ea typeface="Monaco" charset="0"/>
+                <a:cs typeface="Monaco" charset="0"/>
+              </a:rPr>
+              <a:t>/</a:t>
+            </a:r>
+            <a:r>
+              <a:rPr lang="en-US" sz="1300" i="1" dirty="0">
+                <a:latin typeface="Monaco" charset="0"/>
+                <a:ea typeface="Monaco" charset="0"/>
+                <a:cs typeface="Monaco" charset="0"/>
+              </a:rPr>
+              <a:t>tokens</a:t>
+            </a:r>
+            <a:r>
+              <a:rPr lang="en-US" sz="1300" dirty="0">
+                <a:latin typeface="Monaco" charset="0"/>
+                <a:ea typeface="Monaco" charset="0"/>
+                <a:cs typeface="Monaco" charset="0"/>
+              </a:rPr>
+              <a:t>)	</a:t>
+            </a:r>
+            <a:r>
+              <a:rPr lang="en-US" sz="1300" i="1" dirty="0">
+                <a:latin typeface="Source Sans Pro" charset="0"/>
+                <a:ea typeface="Source Sans Pro" charset="0"/>
+                <a:cs typeface="Source Sans Pro" charset="0"/>
+              </a:rPr>
+              <a:t>Count documents/features</a:t>
+            </a:r>
+          </a:p>
+          <a:p>
+            <a:pPr algn="l"/>
             <a:r>
               <a:rPr lang="en-US" sz="1300" dirty="0" err="1">
+                <a:solidFill>
+                  <a:srgbClr val="006AC7"/>
+                </a:solidFill>
+                <a:latin typeface="Monaco" charset="0"/>
+                <a:ea typeface="Monaco" charset="0"/>
+                <a:cs typeface="Monaco" charset="0"/>
+              </a:rPr>
+              <a:t>nfeat</a:t>
+            </a:r>
+            <a:r>
+              <a:rPr lang="en-US" sz="1300" dirty="0">
+                <a:latin typeface="Monaco" charset="0"/>
+                <a:ea typeface="Monaco" charset="0"/>
+                <a:cs typeface="Monaco" charset="0"/>
+              </a:rPr>
+              <a:t>(</a:t>
+            </a:r>
+            <a:r>
+              <a:rPr lang="en-US" sz="1300" i="1" dirty="0">
+                <a:latin typeface="Monaco" charset="0"/>
+                <a:ea typeface="Monaco" charset="0"/>
+                <a:cs typeface="Monaco" charset="0"/>
+              </a:rPr>
+              <a:t>corpus </a:t>
+            </a:r>
+            <a:r>
+              <a:rPr lang="en-US" sz="1300" dirty="0">
+                <a:latin typeface="Monaco" charset="0"/>
+                <a:ea typeface="Monaco" charset="0"/>
+                <a:cs typeface="Monaco" charset="0"/>
+              </a:rPr>
+              <a:t>/</a:t>
+            </a:r>
+            <a:r>
+              <a:rPr lang="en-US" sz="1300" i="1" dirty="0" err="1">
                 <a:latin typeface="Monaco" charset="0"/>
                 <a:ea typeface="Monaco" charset="0"/>
                 <a:cs typeface="Monaco" charset="0"/>
@@ -5522,26 +5505,50 @@
               <a:t>dfm</a:t>
             </a:r>
             <a:r>
+              <a:rPr lang="en-US" sz="1300" i="1" dirty="0">
+                <a:latin typeface="Monaco" charset="0"/>
+                <a:ea typeface="Monaco" charset="0"/>
+                <a:cs typeface="Monaco" charset="0"/>
+              </a:rPr>
+              <a:t> </a:t>
+            </a:r>
+            <a:r>
               <a:rPr lang="en-US" sz="1300" dirty="0">
                 <a:latin typeface="Monaco" charset="0"/>
                 <a:ea typeface="Monaco" charset="0"/>
                 <a:cs typeface="Monaco" charset="0"/>
               </a:rPr>
-              <a:t>/tokens)		</a:t>
+              <a:t>/</a:t>
             </a:r>
             <a:r>
               <a:rPr lang="en-US" sz="1300" i="1" dirty="0">
-                <a:latin typeface="Source Sans Pro" charset="0"/>
-                <a:ea typeface="Source Sans Pro" charset="0"/>
-                <a:cs typeface="Source Sans Pro" charset="0"/>
-              </a:rPr>
-              <a:t>Count documents/features</a:t>
+                <a:latin typeface="Monaco" charset="0"/>
+                <a:ea typeface="Monaco" charset="0"/>
+                <a:cs typeface="Monaco" charset="0"/>
+              </a:rPr>
+              <a:t>tokens</a:t>
+            </a:r>
+            <a:r>
+              <a:rPr lang="en-US" sz="1300" dirty="0">
+                <a:latin typeface="Monaco" charset="0"/>
+                <a:ea typeface="Monaco" charset="0"/>
+                <a:cs typeface="Monaco" charset="0"/>
+              </a:rPr>
+              <a:t>)	</a:t>
+            </a:r>
+            <a:r>
+              <a:rPr lang="en-US" sz="1300" i="1" dirty="0">
+                <a:latin typeface="Source Sans Pro" charset="0"/>
+                <a:ea typeface="Source Sans Pro" charset="0"/>
+                <a:cs typeface="Source Sans Pro" charset="0"/>
+              </a:rPr>
+              <a:t>Count features</a:t>
             </a:r>
           </a:p>
           <a:p>
             <a:pPr algn="l"/>
             <a:r>
-              <a:rPr lang="en-US" sz="1300" dirty="0" err="1">
+              <a:rPr lang="en-US" sz="1300" dirty="0">
                 <a:solidFill>
                   <a:srgbClr val="006AC7"/>
                 </a:solidFill>
@@ -5549,7 +5556,7 @@
                 <a:ea typeface="Monaco" charset="0"/>
                 <a:cs typeface="Monaco" charset="0"/>
               </a:rPr>
-              <a:t>nfeat</a:t>
+              <a:t>summary</a:t>
             </a:r>
             <a:r>
               <a:rPr lang="en-US" sz="1300" dirty="0">
@@ -5557,10 +5564,26 @@
                 <a:ea typeface="Monaco" charset="0"/>
                 <a:cs typeface="Monaco" charset="0"/>
               </a:rPr>
-              <a:t>(corpus/</a:t>
-            </a:r>
-            <a:r>
-              <a:rPr lang="en-US" sz="1300" dirty="0" err="1">
+              <a:t>(</a:t>
+            </a:r>
+            <a:r>
+              <a:rPr lang="en-US" sz="1300" i="1" dirty="0">
+                <a:latin typeface="Monaco" charset="0"/>
+                <a:ea typeface="Monaco" charset="0"/>
+                <a:cs typeface="Monaco" charset="0"/>
+              </a:rPr>
+              <a:t>corpus </a:t>
+            </a:r>
+            <a:r>
+              <a:rPr lang="en-US" sz="1300" dirty="0">
+                <a:latin typeface="Monaco" charset="0"/>
+                <a:ea typeface="Monaco" charset="0"/>
+                <a:cs typeface="Monaco" charset="0"/>
+              </a:rPr>
+              <a:t>/ </a:t>
+            </a:r>
+            <a:r>
+              <a:rPr lang="en-US" sz="1300" i="1" dirty="0" err="1">
                 <a:latin typeface="Monaco" charset="0"/>
                 <a:ea typeface="Monaco" charset="0"/>
                 <a:cs typeface="Monaco" charset="0"/>
@@ -5573,7 +5596,7 @@
                 <a:ea typeface="Monaco" charset="0"/>
                 <a:cs typeface="Monaco" charset="0"/>
               </a:rPr>
-              <a:t>/tokens)	</a:t>
+              <a:t>)		</a:t>
             </a:r>
             <a:r>
               <a:rPr lang="en-US" sz="1300" i="1" dirty="0">
@@ -5581,7 +5604,7 @@
                 <a:ea typeface="Source Sans Pro" charset="0"/>
                 <a:cs typeface="Source Sans Pro" charset="0"/>
               </a:rPr>
-              <a:t>Count features</a:t>
+              <a:t>Print summary</a:t>
             </a:r>
           </a:p>
           <a:p>
@@ -5595,7 +5618,7 @@
                 <a:ea typeface="Monaco" charset="0"/>
                 <a:cs typeface="Monaco" charset="0"/>
               </a:rPr>
-              <a:t>summary</a:t>
+              <a:t>head</a:t>
             </a:r>
             <a:r>
               <a:rPr lang="en-US" sz="1300" dirty="0">
@@ -5603,10 +5626,34 @@
                 <a:ea typeface="Monaco" charset="0"/>
                 <a:cs typeface="Monaco" charset="0"/>
               </a:rPr>
-              <a:t>(corpus/</a:t>
-            </a:r>
-            <a:r>
-              <a:rPr lang="en-US" sz="1300" dirty="0" err="1">
+              <a:t>(</a:t>
+            </a:r>
+            <a:r>
+              <a:rPr lang="en-US" sz="1300" i="1" dirty="0">
+                <a:latin typeface="Monaco" charset="0"/>
+                <a:ea typeface="Monaco" charset="0"/>
+                <a:cs typeface="Monaco" charset="0"/>
+              </a:rPr>
+              <a:t>corpus </a:t>
+            </a:r>
+            <a:r>
+              <a:rPr lang="en-US" sz="1300" dirty="0">
+                <a:latin typeface="Monaco" charset="0"/>
+                <a:ea typeface="Monaco" charset="0"/>
+                <a:cs typeface="Monaco" charset="0"/>
+              </a:rPr>
+              <a:t>/</a:t>
+            </a:r>
+            <a:r>
+              <a:rPr lang="en-US" sz="1300" i="1" dirty="0">
+                <a:latin typeface="Monaco" charset="0"/>
+                <a:ea typeface="Monaco" charset="0"/>
+                <a:cs typeface="Monaco" charset="0"/>
+              </a:rPr>
+              <a:t> </a:t>
+            </a:r>
+            <a:r>
+              <a:rPr lang="en-US" sz="1300" i="1" dirty="0" err="1">
                 <a:latin typeface="Monaco" charset="0"/>
                 <a:ea typeface="Monaco" charset="0"/>
                 <a:cs typeface="Monaco" charset="0"/>
@@ -5627,7 +5674,7 @@
                 <a:ea typeface="Source Sans Pro" charset="0"/>
                 <a:cs typeface="Source Sans Pro" charset="0"/>
               </a:rPr>
-              <a:t>Print summary</a:t>
+              <a:t>Return first part</a:t>
             </a:r>
           </a:p>
           <a:p>
@@ -5641,7 +5688,7 @@
                 <a:ea typeface="Monaco" charset="0"/>
                 <a:cs typeface="Monaco" charset="0"/>
               </a:rPr>
-              <a:t>head</a:t>
+              <a:t>tail</a:t>
             </a:r>
             <a:r>
               <a:rPr lang="en-US" sz="1300" dirty="0">
@@ -5649,10 +5696,34 @@
                 <a:ea typeface="Monaco" charset="0"/>
                 <a:cs typeface="Monaco" charset="0"/>
               </a:rPr>
-              <a:t>(corpus/</a:t>
-            </a:r>
-            <a:r>
-              <a:rPr lang="en-US" sz="1300" dirty="0" err="1">
+              <a:t>(</a:t>
+            </a:r>
+            <a:r>
+              <a:rPr lang="en-US" sz="1300" i="1" dirty="0">
+                <a:latin typeface="Monaco" charset="0"/>
+                <a:ea typeface="Monaco" charset="0"/>
+                <a:cs typeface="Monaco" charset="0"/>
+              </a:rPr>
+              <a:t>corpus </a:t>
+            </a:r>
+            <a:r>
+              <a:rPr lang="en-US" sz="1300" dirty="0">
+                <a:latin typeface="Monaco" charset="0"/>
+                <a:ea typeface="Monaco" charset="0"/>
+                <a:cs typeface="Monaco" charset="0"/>
+              </a:rPr>
+              <a:t>/</a:t>
+            </a:r>
+            <a:r>
+              <a:rPr lang="en-US" sz="1300" i="1" dirty="0">
+                <a:latin typeface="Monaco" charset="0"/>
+                <a:ea typeface="Monaco" charset="0"/>
+                <a:cs typeface="Monaco" charset="0"/>
+              </a:rPr>
+              <a:t> </a:t>
+            </a:r>
+            <a:r>
+              <a:rPr lang="en-US" sz="1300" i="1" dirty="0" err="1">
                 <a:latin typeface="Monaco" charset="0"/>
                 <a:ea typeface="Monaco" charset="0"/>
                 <a:cs typeface="Monaco" charset="0"/>
@@ -5665,53 +5736,7 @@
                 <a:ea typeface="Monaco" charset="0"/>
                 <a:cs typeface="Monaco" charset="0"/>
               </a:rPr>
-              <a:t>)			</a:t>
-            </a:r>
-            <a:r>
-              <a:rPr lang="en-US" sz="1300" i="1" dirty="0">
-                <a:latin typeface="Source Sans Pro" charset="0"/>
-                <a:ea typeface="Source Sans Pro" charset="0"/>
-                <a:cs typeface="Source Sans Pro" charset="0"/>
-              </a:rPr>
-              <a:t>Return first part</a:t>
-            </a:r>
-          </a:p>
-          <a:p>
-            <a:pPr algn="l"/>
-            <a:r>
-              <a:rPr lang="en-US" sz="1300" dirty="0">
-                <a:solidFill>
-                  <a:srgbClr val="006AC7"/>
-                </a:solidFill>
-                <a:latin typeface="Monaco" charset="0"/>
-                <a:ea typeface="Monaco" charset="0"/>
-                <a:cs typeface="Monaco" charset="0"/>
-              </a:rPr>
-              <a:t>tail</a:t>
-            </a:r>
-            <a:r>
-              <a:rPr lang="en-US" sz="1300" dirty="0">
-                <a:latin typeface="Monaco" charset="0"/>
-                <a:ea typeface="Monaco" charset="0"/>
-                <a:cs typeface="Monaco" charset="0"/>
-              </a:rPr>
-              <a:t>(corpus/</a:t>
-            </a:r>
-            <a:r>
-              <a:rPr lang="en-US" sz="1300" dirty="0" err="1">
-                <a:latin typeface="Monaco" charset="0"/>
-                <a:ea typeface="Monaco" charset="0"/>
-                <a:cs typeface="Monaco" charset="0"/>
-              </a:rPr>
-              <a:t>dfm</a:t>
-            </a:r>
-            <a:r>
-              <a:rPr lang="en-US" sz="1300" dirty="0">
-                <a:latin typeface="Monaco" charset="0"/>
-                <a:ea typeface="Monaco" charset="0"/>
-                <a:cs typeface="Monaco" charset="0"/>
-              </a:rPr>
-              <a:t>)			</a:t>
+              <a:t>)		</a:t>
             </a:r>
             <a:r>
               <a:rPr lang="en-US" sz="1300" i="1" dirty="0">
@@ -5737,8 +5762,8 @@
         </p:nvSpPr>
         <p:spPr>
           <a:xfrm>
-            <a:off x="10485053" y="10386648"/>
-            <a:ext cx="3340068" cy="272382"/>
+            <a:off x="10435583" y="10386648"/>
+            <a:ext cx="3389538" cy="272382"/>
           </a:xfrm>
           <a:prstGeom prst="rect">
             <a:avLst/>
@@ -5829,8 +5854,8 @@
         </p:nvSpPr>
         <p:spPr>
           <a:xfrm>
-            <a:off x="167426" y="441367"/>
-            <a:ext cx="6363268" cy="4396107"/>
+            <a:off x="167426" y="441368"/>
+            <a:ext cx="6363268" cy="4190121"/>
           </a:xfrm>
           <a:prstGeom prst="rect">
             <a:avLst/>
@@ -5899,8 +5924,8 @@
         </p:nvSpPr>
         <p:spPr>
           <a:xfrm>
-            <a:off x="168514" y="5210934"/>
-            <a:ext cx="6362365" cy="4396107"/>
+            <a:off x="169806" y="4931798"/>
+            <a:ext cx="6362365" cy="4625726"/>
           </a:xfrm>
           <a:prstGeom prst="rect">
             <a:avLst/>
@@ -5969,8 +5994,8 @@
         </p:nvSpPr>
         <p:spPr>
           <a:xfrm>
-            <a:off x="6684461" y="441367"/>
-            <a:ext cx="7178303" cy="3120579"/>
+            <a:off x="6684461" y="441368"/>
+            <a:ext cx="7178303" cy="4190120"/>
           </a:xfrm>
           <a:prstGeom prst="rect">
             <a:avLst/>
@@ -6039,8 +6064,8 @@
         </p:nvSpPr>
         <p:spPr>
           <a:xfrm>
-            <a:off x="6676472" y="3916352"/>
-            <a:ext cx="7178303" cy="5688180"/>
+            <a:off x="6676472" y="4986597"/>
+            <a:ext cx="7178303" cy="4570927"/>
           </a:xfrm>
           <a:prstGeom prst="rect">
             <a:avLst/>
@@ -6109,8 +6134,8 @@
         </p:nvSpPr>
         <p:spPr>
           <a:xfrm>
-            <a:off x="6799471" y="823634"/>
-            <a:ext cx="7107106" cy="2564805"/>
+            <a:off x="6794697" y="1199478"/>
+            <a:ext cx="7107106" cy="3098284"/>
           </a:xfrm>
           <a:prstGeom prst="rect">
             <a:avLst/>
@@ -6247,6 +6272,68 @@
               </a:spcBef>
             </a:pPr>
             <a:r>
+              <a:rPr lang="en-GB" sz="1500" b="1" dirty="0">
+                <a:latin typeface="Source Sans Pro" charset="0"/>
+                <a:ea typeface="Source Sans Pro" charset="0"/>
+                <a:cs typeface="Source Sans Pro" charset="0"/>
+              </a:rPr>
+              <a:t>SVM classifier for texts</a:t>
+            </a:r>
+          </a:p>
+          <a:p>
+            <a:pPr algn="l"/>
+            <a:r>
+              <a:rPr lang="en-GB" sz="1300" dirty="0" err="1">
+                <a:solidFill>
+                  <a:srgbClr val="006AC7"/>
+                </a:solidFill>
+                <a:latin typeface="Monaco" charset="0"/>
+                <a:ea typeface="Monaco" charset="0"/>
+                <a:cs typeface="Monaco" charset="0"/>
+              </a:rPr>
+              <a:t>textmodel_svm</a:t>
+            </a:r>
+            <a:r>
+              <a:rPr lang="en-GB" sz="1300" dirty="0">
+                <a:solidFill>
+                  <a:schemeClr val="tx1"/>
+                </a:solidFill>
+                <a:latin typeface="Monaco" charset="0"/>
+                <a:ea typeface="Monaco" charset="0"/>
+                <a:cs typeface="Monaco" charset="0"/>
+              </a:rPr>
+              <a:t>(x, y = </a:t>
+            </a:r>
+            <a:r>
+              <a:rPr lang="en-GB" sz="1300" dirty="0" err="1">
+                <a:solidFill>
+                  <a:schemeClr val="tx1"/>
+                </a:solidFill>
+                <a:latin typeface="Monaco" charset="0"/>
+                <a:ea typeface="Monaco" charset="0"/>
+                <a:cs typeface="Monaco" charset="0"/>
+              </a:rPr>
+              <a:t>training_labels</a:t>
+            </a:r>
+            <a:r>
+              <a:rPr lang="en-GB" sz="1300" dirty="0">
+                <a:solidFill>
+                  <a:schemeClr val="tx1"/>
+                </a:solidFill>
+                <a:latin typeface="Monaco" charset="0"/>
+                <a:ea typeface="Monaco" charset="0"/>
+                <a:cs typeface="Monaco" charset="0"/>
+              </a:rPr>
+              <a:t>)</a:t>
+            </a:r>
+          </a:p>
+          <a:p>
+            <a:pPr algn="l">
+              <a:spcBef>
+                <a:spcPts val="800"/>
+              </a:spcBef>
+            </a:pPr>
+            <a:r>
               <a:rPr lang="en-GB" sz="1500" b="1" dirty="0" err="1">
                 <a:solidFill>
                   <a:schemeClr val="tx1"/>
@@ -6547,7 +6634,7 @@
                 <a:ea typeface="Source Sans Pro" charset="0"/>
                 <a:cs typeface="Source Sans Pro" charset="0"/>
               </a:rPr>
-              <a:t> methods: </a:t>
+              <a:t> methods:  </a:t>
             </a:r>
             <a:r>
               <a:rPr lang="en-GB" sz="1300" dirty="0">
@@ -6648,8 +6735,8 @@
         </p:nvSpPr>
         <p:spPr>
           <a:xfrm>
-            <a:off x="6799156" y="4249220"/>
-            <a:ext cx="6948911" cy="5355312"/>
+            <a:off x="6799156" y="5267948"/>
+            <a:ext cx="6948911" cy="4355038"/>
           </a:xfrm>
           <a:prstGeom prst="rect">
             <a:avLst/>
@@ -6773,7 +6860,7 @@
             <a:r>
               <a:rPr lang="en-GB" sz="1300" dirty="0" err="1">
                 <a:solidFill>
-                  <a:schemeClr val="tx1"/>
+                  <a:srgbClr val="006AC7"/>
                 </a:solidFill>
                 <a:latin typeface="Monaco" charset="0"/>
                 <a:ea typeface="Monaco" charset="0"/>
@@ -6795,7 +6882,7 @@
                 <a:ea typeface="Monaco" charset="0"/>
                 <a:cs typeface="Monaco" charset="0"/>
               </a:rPr>
-              <a:t>english</a:t>
+              <a:t>en</a:t>
             </a:r>
             <a:r>
               <a:rPr lang="en-GB" sz="1300" dirty="0">
@@ -6846,6 +6933,11 @@
               </a:rPr>
               <a:t>	</a:t>
             </a:r>
+            <a:endParaRPr lang="en-GB" sz="1300" b="1" dirty="0">
+              <a:latin typeface="Source Sans Pro" charset="0"/>
+              <a:ea typeface="Source Sans Pro" charset="0"/>
+              <a:cs typeface="Source Sans Pro" charset="0"/>
+            </a:endParaRPr>
           </a:p>
           <a:p>
             <a:pPr algn="l"/>
@@ -6855,7 +6947,15 @@
                 <a:ea typeface="Source Sans Pro" charset="0"/>
                 <a:cs typeface="Source Sans Pro" charset="0"/>
               </a:rPr>
-              <a:t>Plot the dispersion of key word(s)</a:t>
+              <a:t>Plot word </a:t>
+            </a:r>
+            <a:r>
+              <a:rPr lang="en-GB" sz="1500" b="1" dirty="0" err="1">
+                <a:latin typeface="Source Sans Pro" charset="0"/>
+                <a:ea typeface="Source Sans Pro" charset="0"/>
+                <a:cs typeface="Source Sans Pro" charset="0"/>
+              </a:rPr>
+              <a:t>keyness</a:t>
             </a:r>
             <a:endParaRPr lang="en-GB" sz="1500" dirty="0">
               <a:latin typeface="Source Sans Pro" charset="0"/>
@@ -6867,9 +6967,6 @@
             <a:pPr algn="l"/>
             <a:r>
               <a:rPr lang="en-GB" sz="1300" dirty="0" err="1">
-                <a:solidFill>
-                  <a:schemeClr val="tx1"/>
-                </a:solidFill>
                 <a:latin typeface="Monaco" charset="0"/>
                 <a:ea typeface="Monaco" charset="0"/>
                 <a:cs typeface="Monaco" charset="0"/>
@@ -6878,9 +6975,6 @@
             </a:r>
             <a:r>
               <a:rPr lang="en-GB" sz="1300" dirty="0">
-                <a:solidFill>
-                  <a:schemeClr val="tx1"/>
-                </a:solidFill>
                 <a:latin typeface="Monaco" charset="0"/>
                 <a:ea typeface="Monaco" charset="0"/>
                 <a:cs typeface="Monaco" charset="0"/>
@@ -6892,9 +6986,6 @@
             <a:pPr algn="l"/>
             <a:r>
               <a:rPr lang="en-GB" sz="1300" dirty="0">
-                <a:solidFill>
-                  <a:schemeClr val="tx1"/>
-                </a:solidFill>
                 <a:latin typeface="Monaco" charset="0"/>
                 <a:ea typeface="Monaco" charset="0"/>
                 <a:cs typeface="Monaco" charset="0"/>
@@ -6914,23 +7005,28 @@
             </a:r>
             <a:r>
               <a:rPr lang="en-GB" sz="1300" dirty="0">
-                <a:solidFill>
-                  <a:schemeClr val="tx1"/>
-                </a:solidFill>
-                <a:latin typeface="Monaco" charset="0"/>
-                <a:ea typeface="Monaco" charset="0"/>
-                <a:cs typeface="Monaco" charset="0"/>
-              </a:rPr>
-              <a:t>(Year &gt; 1945) %&gt;%   </a:t>
+                <a:latin typeface="Monaco" charset="0"/>
+                <a:ea typeface="Monaco" charset="0"/>
+                <a:cs typeface="Monaco" charset="0"/>
+              </a:rPr>
+              <a:t>(President %in% </a:t>
             </a:r>
           </a:p>
           <a:p>
             <a:pPr algn="l"/>
             <a:r>
               <a:rPr lang="en-GB" sz="1300" dirty="0">
-                <a:solidFill>
-                  <a:schemeClr val="tx1"/>
-                </a:solidFill>
+                <a:latin typeface="Monaco" charset="0"/>
+                <a:ea typeface="Monaco" charset="0"/>
+                <a:cs typeface="Monaco" charset="0"/>
+              </a:rPr>
+              <a:t>  		    c("Obama", "Trump")) %&gt;%</a:t>
+            </a:r>
+          </a:p>
+          <a:p>
+            <a:pPr algn="l"/>
+            <a:r>
+              <a:rPr lang="en-GB" sz="1300" dirty="0">
                 <a:latin typeface="Monaco" charset="0"/>
                 <a:ea typeface="Monaco" charset="0"/>
                 <a:cs typeface="Monaco" charset="0"/>
@@ -6946,13 +7042,40 @@
                 <a:ea typeface="Monaco" charset="0"/>
                 <a:cs typeface="Monaco" charset="0"/>
               </a:rPr>
-              <a:t>kwic</a:t>
+              <a:t>dfm</a:t>
             </a:r>
             <a:r>
               <a:rPr lang="en-GB" sz="1300" dirty="0">
-                <a:solidFill>
-                  <a:schemeClr val="tx1"/>
-                </a:solidFill>
+                <a:latin typeface="Monaco" charset="0"/>
+                <a:ea typeface="Monaco" charset="0"/>
+                <a:cs typeface="Monaco" charset="0"/>
+              </a:rPr>
+              <a:t>(groups = "President", </a:t>
+            </a:r>
+          </a:p>
+          <a:p>
+            <a:pPr algn="l"/>
+            <a:r>
+              <a:rPr lang="en-GB" sz="1300" dirty="0">
+                <a:latin typeface="Monaco" charset="0"/>
+                <a:ea typeface="Monaco" charset="0"/>
+                <a:cs typeface="Monaco" charset="0"/>
+              </a:rPr>
+              <a:t>	remove = </a:t>
+            </a:r>
+            <a:r>
+              <a:rPr lang="en-GB" sz="1300" dirty="0" err="1">
+                <a:solidFill>
+                  <a:srgbClr val="006AC7"/>
+                </a:solidFill>
+                <a:latin typeface="Monaco" charset="0"/>
+                <a:ea typeface="Monaco" charset="0"/>
+                <a:cs typeface="Monaco" charset="0"/>
+              </a:rPr>
+              <a:t>stopwords</a:t>
+            </a:r>
+            <a:r>
+              <a:rPr lang="en-GB" sz="1300" dirty="0">
                 <a:latin typeface="Monaco" charset="0"/>
                 <a:ea typeface="Monaco" charset="0"/>
                 <a:cs typeface="Monaco" charset="0"/>
@@ -6961,25 +7084,19 @@
             </a:r>
             <a:r>
               <a:rPr lang="en-GB" sz="1300" dirty="0" err="1">
-                <a:solidFill>
-                  <a:schemeClr val="tx1"/>
-                </a:solidFill>
-                <a:latin typeface="Monaco" charset="0"/>
-                <a:ea typeface="Monaco" charset="0"/>
-                <a:cs typeface="Monaco" charset="0"/>
-              </a:rPr>
-              <a:t>american</a:t>
+                <a:latin typeface="Monaco" charset="0"/>
+                <a:ea typeface="Monaco" charset="0"/>
+                <a:cs typeface="Monaco" charset="0"/>
+              </a:rPr>
+              <a:t>en</a:t>
             </a:r>
             <a:r>
               <a:rPr lang="en-GB" sz="1300" dirty="0">
-                <a:solidFill>
-                  <a:schemeClr val="tx1"/>
-                </a:solidFill>
-                <a:latin typeface="Monaco" charset="0"/>
-                <a:ea typeface="Monaco" charset="0"/>
-                <a:cs typeface="Monaco" charset="0"/>
-              </a:rPr>
-              <a:t>") %&gt;%   </a:t>
+                <a:latin typeface="Monaco" charset="0"/>
+                <a:ea typeface="Monaco" charset="0"/>
+                <a:cs typeface="Monaco" charset="0"/>
+              </a:rPr>
+              <a:t>")) %&gt;%   </a:t>
             </a:r>
           </a:p>
           <a:p>
@@ -6987,7 +7104,7 @@
             <a:r>
               <a:rPr lang="en-GB" sz="1300" dirty="0">
                 <a:solidFill>
-                  <a:schemeClr val="tx1"/>
+                  <a:srgbClr val="006AC7"/>
                 </a:solidFill>
                 <a:latin typeface="Monaco" charset="0"/>
                 <a:ea typeface="Monaco" charset="0"/>
@@ -7004,27 +7121,49 @@
                 <a:ea typeface="Monaco" charset="0"/>
                 <a:cs typeface="Monaco" charset="0"/>
               </a:rPr>
-              <a:t>textplot_xray</a:t>
+              <a:t>textstat_keyness</a:t>
             </a:r>
             <a:r>
               <a:rPr lang="en-GB" sz="1300" dirty="0">
-                <a:solidFill>
-                  <a:schemeClr val="tx1"/>
-                </a:solidFill>
+                <a:latin typeface="Monaco" charset="0"/>
+                <a:ea typeface="Monaco" charset="0"/>
+                <a:cs typeface="Monaco" charset="0"/>
+              </a:rPr>
+              <a:t>(target = "Trump") %&gt;%   </a:t>
+            </a:r>
+          </a:p>
+          <a:p>
+            <a:pPr algn="l"/>
+            <a:r>
+              <a:rPr lang="en-GB" sz="1300" dirty="0">
+                <a:solidFill>
+                  <a:srgbClr val="006AC7"/>
+                </a:solidFill>
+                <a:latin typeface="Monaco" charset="0"/>
+                <a:ea typeface="Monaco" charset="0"/>
+                <a:cs typeface="Monaco" charset="0"/>
+              </a:rPr>
+              <a:t>  </a:t>
+            </a:r>
+            <a:r>
+              <a:rPr lang="en-GB" sz="1300" dirty="0" err="1">
+                <a:solidFill>
+                  <a:srgbClr val="006AC7"/>
+                </a:solidFill>
+                <a:latin typeface="Monaco" charset="0"/>
+                <a:ea typeface="Monaco" charset="0"/>
+                <a:cs typeface="Monaco" charset="0"/>
+              </a:rPr>
+              <a:t>textplot_keyness</a:t>
+            </a:r>
+            <a:r>
+              <a:rPr lang="en-GB" sz="1300" dirty="0">
                 <a:latin typeface="Monaco" charset="0"/>
                 <a:ea typeface="Monaco" charset="0"/>
                 <a:cs typeface="Monaco" charset="0"/>
               </a:rPr>
               <a:t>()</a:t>
             </a:r>
-            <a:endParaRPr lang="en-GB" sz="1300" dirty="0">
-              <a:solidFill>
-                <a:schemeClr val="tx1"/>
-              </a:solidFill>
-              <a:latin typeface="Source Sans Pro" charset="0"/>
-              <a:ea typeface="Source Sans Pro" charset="0"/>
-              <a:cs typeface="Source Sans Pro" charset="0"/>
-            </a:endParaRPr>
           </a:p>
           <a:p>
             <a:pPr algn="l"/>
@@ -7042,7 +7181,7 @@
                 <a:ea typeface="Source Sans Pro" charset="0"/>
                 <a:cs typeface="Source Sans Pro" charset="0"/>
               </a:rPr>
-              <a:t>Plot word </a:t>
+              <a:t>Plot </a:t>
             </a:r>
             <a:r>
               <a:rPr lang="en-GB" sz="1500" b="1" dirty="0" err="1">
@@ -7050,9 +7189,60 @@
                 <a:ea typeface="Source Sans Pro" charset="0"/>
                 <a:cs typeface="Source Sans Pro" charset="0"/>
               </a:rPr>
-              <a:t>keyness</a:t>
-            </a:r>
-            <a:endParaRPr lang="en-GB" sz="1500" dirty="0">
+              <a:t>Wordfish</a:t>
+            </a:r>
+            <a:r>
+              <a:rPr lang="en-GB" sz="1500" b="1" dirty="0">
+                <a:latin typeface="Source Sans Pro" charset="0"/>
+                <a:ea typeface="Source Sans Pro" charset="0"/>
+                <a:cs typeface="Source Sans Pro" charset="0"/>
+              </a:rPr>
+              <a:t>, </a:t>
+            </a:r>
+            <a:r>
+              <a:rPr lang="en-GB" sz="1500" b="1" dirty="0" err="1">
+                <a:latin typeface="Source Sans Pro" charset="0"/>
+                <a:ea typeface="Source Sans Pro" charset="0"/>
+                <a:cs typeface="Source Sans Pro" charset="0"/>
+              </a:rPr>
+              <a:t>Wordscores</a:t>
+            </a:r>
+            <a:r>
+              <a:rPr lang="en-GB" sz="1500" b="1" dirty="0">
+                <a:latin typeface="Source Sans Pro" charset="0"/>
+                <a:ea typeface="Source Sans Pro" charset="0"/>
+                <a:cs typeface="Source Sans Pro" charset="0"/>
+              </a:rPr>
+              <a:t> or CA models </a:t>
+            </a:r>
+          </a:p>
+          <a:p>
+            <a:pPr algn="l"/>
+            <a:r>
+              <a:rPr lang="en-GB" sz="1500" dirty="0">
+                <a:latin typeface="Source Sans Pro" charset="0"/>
+                <a:ea typeface="Source Sans Pro" charset="0"/>
+                <a:cs typeface="Source Sans Pro" charset="0"/>
+              </a:rPr>
+              <a:t>(requires the </a:t>
+            </a:r>
+            <a:r>
+              <a:rPr lang="en-GB" sz="1500" b="1" dirty="0" err="1">
+                <a:latin typeface="Source Sans Pro" charset="0"/>
+                <a:ea typeface="Source Sans Pro" charset="0"/>
+                <a:cs typeface="Source Sans Pro" charset="0"/>
+              </a:rPr>
+              <a:t>quanteda.textmodels</a:t>
+            </a:r>
+            <a:r>
+              <a:rPr lang="en-GB" sz="1500" dirty="0">
+                <a:latin typeface="Source Sans Pro" charset="0"/>
+                <a:ea typeface="Source Sans Pro" charset="0"/>
+                <a:cs typeface="Source Sans Pro" charset="0"/>
+              </a:rPr>
+              <a:t> package)</a:t>
+            </a:r>
+            <a:endParaRPr lang="en-GB" sz="1500" b="1" dirty="0">
               <a:latin typeface="Source Sans Pro" charset="0"/>
               <a:ea typeface="Source Sans Pro" charset="0"/>
               <a:cs typeface="Source Sans Pro" charset="0"/>
@@ -7061,12 +7251,20 @@
           <a:p>
             <a:pPr algn="l"/>
             <a:r>
-              <a:rPr lang="en-GB" sz="1300" dirty="0" err="1">
-                <a:latin typeface="Monaco" charset="0"/>
-                <a:ea typeface="Monaco" charset="0"/>
-                <a:cs typeface="Monaco" charset="0"/>
-              </a:rPr>
-              <a:t>data_corpus_inaugural</a:t>
+              <a:rPr lang="en-GB" sz="1300" i="1" dirty="0" err="1">
+                <a:latin typeface="Monaco" charset="0"/>
+                <a:ea typeface="Monaco" charset="0"/>
+                <a:cs typeface="Monaco" charset="0"/>
+              </a:rPr>
+              <a:t>scaling_model</a:t>
+            </a:r>
+            <a:r>
+              <a:rPr lang="en-GB" sz="1300" i="1" dirty="0">
+                <a:latin typeface="Monaco" charset="0"/>
+                <a:ea typeface="Monaco" charset="0"/>
+                <a:cs typeface="Monaco" charset="0"/>
+              </a:rPr>
+              <a:t> </a:t>
             </a:r>
             <a:r>
               <a:rPr lang="en-GB" sz="1300" dirty="0">
@@ -7074,7 +7272,7 @@
                 <a:ea typeface="Monaco" charset="0"/>
                 <a:cs typeface="Monaco" charset="0"/>
               </a:rPr>
-              <a:t> %&gt;%   </a:t>
+              <a:t>%&gt;% </a:t>
             </a:r>
           </a:p>
           <a:p>
@@ -7088,7 +7286,7 @@
               <a:t>  </a:t>
             </a:r>
             <a:r>
-              <a:rPr lang="en-GB" sz="1300" dirty="0" err="1">
+              <a:rPr lang="en-GB" sz="1300" dirty="0">
                 <a:solidFill>
                   <a:srgbClr val="006AC7"/>
                 </a:solidFill>
@@ -7096,7 +7294,7 @@
                 <a:ea typeface="Monaco" charset="0"/>
                 <a:cs typeface="Monaco" charset="0"/>
               </a:rPr>
-              <a:t>corpus_subset</a:t>
+              <a:t>textplot_scale1d</a:t>
             </a:r>
             <a:r>
               <a:rPr lang="en-GB" sz="1300" dirty="0">
@@ -7104,7 +7302,7 @@
                 <a:ea typeface="Monaco" charset="0"/>
                 <a:cs typeface="Monaco" charset="0"/>
               </a:rPr>
-              <a:t>(President %in% </a:t>
+              <a:t>(groups = party, </a:t>
             </a:r>
           </a:p>
           <a:p>
@@ -7115,260 +7313,7 @@
                 <a:ea typeface="Monaco" charset="0"/>
                 <a:cs typeface="Monaco" charset="0"/>
               </a:rPr>
-              <a:t>  		    c("Obama", "Trump")) %&gt;%</a:t>
-            </a:r>
-          </a:p>
-          <a:p>
-            <a:pPr algn="l"/>
-            <a:r>
-              <a:rPr lang="en-GB" sz="1300" dirty="0">
-                <a:latin typeface="Monaco" charset="0"/>
-                <a:ea typeface="Monaco" charset="0"/>
-                <a:cs typeface="Monaco" charset="0"/>
-              </a:rPr>
-              <a:t>  </a:t>
-            </a:r>
-            <a:r>
-              <a:rPr lang="en-GB" sz="1300" dirty="0" err="1">
-                <a:solidFill>
-                  <a:srgbClr val="006AC7"/>
-                </a:solidFill>
-                <a:latin typeface="Monaco" charset="0"/>
-                <a:ea typeface="Monaco" charset="0"/>
-                <a:cs typeface="Monaco" charset="0"/>
-              </a:rPr>
-              <a:t>dfm</a:t>
-            </a:r>
-            <a:r>
-              <a:rPr lang="en-GB" sz="1300" dirty="0">
-                <a:latin typeface="Monaco" charset="0"/>
-                <a:ea typeface="Monaco" charset="0"/>
-                <a:cs typeface="Monaco" charset="0"/>
-              </a:rPr>
-              <a:t>(groups = "President", </a:t>
-            </a:r>
-          </a:p>
-          <a:p>
-            <a:pPr algn="l"/>
-            <a:r>
-              <a:rPr lang="en-GB" sz="1300" dirty="0">
-                <a:latin typeface="Monaco" charset="0"/>
-                <a:ea typeface="Monaco" charset="0"/>
-                <a:cs typeface="Monaco" charset="0"/>
-              </a:rPr>
-              <a:t>	remove = </a:t>
-            </a:r>
-            <a:r>
-              <a:rPr lang="en-GB" sz="1300" dirty="0" err="1">
-                <a:solidFill>
-                  <a:schemeClr val="tx1"/>
-                </a:solidFill>
-                <a:latin typeface="Monaco" charset="0"/>
-                <a:ea typeface="Monaco" charset="0"/>
-                <a:cs typeface="Monaco" charset="0"/>
-              </a:rPr>
-              <a:t>stopwords</a:t>
-            </a:r>
-            <a:r>
-              <a:rPr lang="en-GB" sz="1300" dirty="0">
-                <a:latin typeface="Monaco" charset="0"/>
-                <a:ea typeface="Monaco" charset="0"/>
-                <a:cs typeface="Monaco" charset="0"/>
-              </a:rPr>
-              <a:t>("</a:t>
-            </a:r>
-            <a:r>
-              <a:rPr lang="en-GB" sz="1300" dirty="0" err="1">
-                <a:latin typeface="Monaco" charset="0"/>
-                <a:ea typeface="Monaco" charset="0"/>
-                <a:cs typeface="Monaco" charset="0"/>
-              </a:rPr>
-              <a:t>english</a:t>
-            </a:r>
-            <a:r>
-              <a:rPr lang="en-GB" sz="1300" dirty="0">
-                <a:latin typeface="Monaco" charset="0"/>
-                <a:ea typeface="Monaco" charset="0"/>
-                <a:cs typeface="Monaco" charset="0"/>
-              </a:rPr>
-              <a:t>")) %&gt;%   </a:t>
-            </a:r>
-          </a:p>
-          <a:p>
-            <a:pPr algn="l"/>
-            <a:r>
-              <a:rPr lang="en-GB" sz="1300" dirty="0">
-                <a:solidFill>
-                  <a:srgbClr val="006AC7"/>
-                </a:solidFill>
-                <a:latin typeface="Monaco" charset="0"/>
-                <a:ea typeface="Monaco" charset="0"/>
-                <a:cs typeface="Monaco" charset="0"/>
-              </a:rPr>
-              <a:t>  </a:t>
-            </a:r>
-            <a:r>
-              <a:rPr lang="en-GB" sz="1300" dirty="0" err="1">
-                <a:solidFill>
-                  <a:srgbClr val="006AC7"/>
-                </a:solidFill>
-                <a:latin typeface="Monaco" charset="0"/>
-                <a:ea typeface="Monaco" charset="0"/>
-                <a:cs typeface="Monaco" charset="0"/>
-              </a:rPr>
-              <a:t>textstat_keyness</a:t>
-            </a:r>
-            <a:r>
-              <a:rPr lang="en-GB" sz="1300" dirty="0">
-                <a:latin typeface="Monaco" charset="0"/>
-                <a:ea typeface="Monaco" charset="0"/>
-                <a:cs typeface="Monaco" charset="0"/>
-              </a:rPr>
-              <a:t>(target = "Trump") %&gt;%   </a:t>
-            </a:r>
-          </a:p>
-          <a:p>
-            <a:pPr algn="l"/>
-            <a:r>
-              <a:rPr lang="en-GB" sz="1300" dirty="0">
-                <a:solidFill>
-                  <a:srgbClr val="006AC7"/>
-                </a:solidFill>
-                <a:latin typeface="Monaco" charset="0"/>
-                <a:ea typeface="Monaco" charset="0"/>
-                <a:cs typeface="Monaco" charset="0"/>
-              </a:rPr>
-              <a:t>  </a:t>
-            </a:r>
-            <a:r>
-              <a:rPr lang="en-GB" sz="1300" dirty="0" err="1">
-                <a:solidFill>
-                  <a:srgbClr val="006AC7"/>
-                </a:solidFill>
-                <a:latin typeface="Monaco" charset="0"/>
-                <a:ea typeface="Monaco" charset="0"/>
-                <a:cs typeface="Monaco" charset="0"/>
-              </a:rPr>
-              <a:t>textplot_keyness</a:t>
-            </a:r>
-            <a:r>
-              <a:rPr lang="en-GB" sz="1300" dirty="0">
-                <a:latin typeface="Monaco" charset="0"/>
-                <a:ea typeface="Monaco" charset="0"/>
-                <a:cs typeface="Monaco" charset="0"/>
-              </a:rPr>
-              <a:t>()</a:t>
-            </a:r>
-          </a:p>
-          <a:p>
-            <a:pPr algn="l"/>
-            <a:endParaRPr lang="en-GB" sz="1300" b="1" dirty="0">
-              <a:latin typeface="Source Sans Pro" charset="0"/>
-              <a:ea typeface="Source Sans Pro" charset="0"/>
-              <a:cs typeface="Source Sans Pro" charset="0"/>
-            </a:endParaRPr>
-          </a:p>
-          <a:p>
-            <a:pPr algn="l"/>
-            <a:r>
-              <a:rPr lang="en-GB" sz="1500" b="1" dirty="0">
-                <a:latin typeface="Source Sans Pro" charset="0"/>
-                <a:ea typeface="Source Sans Pro" charset="0"/>
-                <a:cs typeface="Source Sans Pro" charset="0"/>
-              </a:rPr>
-              <a:t>Plot </a:t>
-            </a:r>
-            <a:r>
-              <a:rPr lang="en-GB" sz="1500" b="1" dirty="0" err="1">
-                <a:latin typeface="Source Sans Pro" charset="0"/>
-                <a:ea typeface="Source Sans Pro" charset="0"/>
-                <a:cs typeface="Source Sans Pro" charset="0"/>
-              </a:rPr>
-              <a:t>Wordfish</a:t>
-            </a:r>
-            <a:r>
-              <a:rPr lang="en-GB" sz="1500" b="1" dirty="0">
-                <a:latin typeface="Source Sans Pro" charset="0"/>
-                <a:ea typeface="Source Sans Pro" charset="0"/>
-                <a:cs typeface="Source Sans Pro" charset="0"/>
-              </a:rPr>
-              <a:t>, </a:t>
-            </a:r>
-            <a:r>
-              <a:rPr lang="en-GB" sz="1500" b="1" dirty="0" err="1">
-                <a:latin typeface="Source Sans Pro" charset="0"/>
-                <a:ea typeface="Source Sans Pro" charset="0"/>
-                <a:cs typeface="Source Sans Pro" charset="0"/>
-              </a:rPr>
-              <a:t>Wordscores</a:t>
-            </a:r>
-            <a:r>
-              <a:rPr lang="en-GB" sz="1500" b="1" dirty="0">
-                <a:latin typeface="Source Sans Pro" charset="0"/>
-                <a:ea typeface="Source Sans Pro" charset="0"/>
-                <a:cs typeface="Source Sans Pro" charset="0"/>
-              </a:rPr>
-              <a:t> or CA models</a:t>
-            </a:r>
-          </a:p>
-          <a:p>
-            <a:pPr algn="l"/>
-            <a:r>
-              <a:rPr lang="en-GB" sz="1300" dirty="0">
-                <a:solidFill>
-                  <a:srgbClr val="006AC7"/>
-                </a:solidFill>
-                <a:latin typeface="Monaco" charset="0"/>
-                <a:ea typeface="Monaco" charset="0"/>
-                <a:cs typeface="Monaco" charset="0"/>
-              </a:rPr>
-              <a:t>textplot_scale1d</a:t>
-            </a:r>
-            <a:r>
-              <a:rPr lang="en-GB" sz="1300" dirty="0">
-                <a:latin typeface="Monaco" charset="0"/>
-                <a:ea typeface="Monaco" charset="0"/>
-                <a:cs typeface="Monaco" charset="0"/>
-              </a:rPr>
-              <a:t>(</a:t>
-            </a:r>
-            <a:r>
-              <a:rPr lang="en-GB" sz="1300" i="1" dirty="0" err="1">
-                <a:latin typeface="Monaco" charset="0"/>
-                <a:ea typeface="Monaco" charset="0"/>
-                <a:cs typeface="Monaco" charset="0"/>
-              </a:rPr>
-              <a:t>scaling_model</a:t>
-            </a:r>
-            <a:r>
-              <a:rPr lang="en-GB" sz="1300" dirty="0">
-                <a:latin typeface="Monaco" charset="0"/>
-                <a:ea typeface="Monaco" charset="0"/>
-                <a:cs typeface="Monaco" charset="0"/>
-              </a:rPr>
-              <a:t>, </a:t>
-            </a:r>
-          </a:p>
-          <a:p>
-            <a:pPr algn="l"/>
-            <a:r>
-              <a:rPr lang="en-GB" sz="1300" dirty="0">
-                <a:latin typeface="Monaco" charset="0"/>
-                <a:ea typeface="Monaco" charset="0"/>
-                <a:cs typeface="Monaco" charset="0"/>
-              </a:rPr>
-              <a:t>  groups = party, </a:t>
-            </a:r>
-          </a:p>
-          <a:p>
-            <a:pPr algn="l"/>
-            <a:r>
-              <a:rPr lang="en-GB" sz="1300" dirty="0">
-                <a:latin typeface="Monaco" charset="0"/>
-                <a:ea typeface="Monaco" charset="0"/>
-                <a:cs typeface="Monaco" charset="0"/>
-              </a:rPr>
-              <a:t>  margin = "documents")</a:t>
+              <a:t>                   margin = "documents")</a:t>
             </a:r>
             <a:r>
               <a:rPr lang="en-GB" sz="1300" dirty="0">
@@ -7397,8 +7342,8 @@
         </p:nvSpPr>
         <p:spPr>
           <a:xfrm>
-            <a:off x="288186" y="5691758"/>
-            <a:ext cx="6265777" cy="3698448"/>
+            <a:off x="289478" y="5412621"/>
+            <a:ext cx="6265777" cy="4098558"/>
           </a:xfrm>
           <a:prstGeom prst="rect">
             <a:avLst/>
@@ -7519,22 +7464,6 @@
               <a:t>(x) </a:t>
             </a:r>
             <a:r>
-              <a:rPr lang="en-GB" sz="1300" i="1" dirty="0">
-                <a:latin typeface="Source Sans Pro" charset="0"/>
-                <a:ea typeface="Source Sans Pro" charset="0"/>
-                <a:cs typeface="Source Sans Pro" charset="0"/>
-              </a:rPr>
-              <a:t>|</a:t>
-            </a:r>
-            <a:r>
-              <a:rPr lang="en-GB" sz="1300" i="1" dirty="0">
-                <a:latin typeface="Monaco" charset="0"/>
-                <a:ea typeface="Monaco" charset="0"/>
-                <a:cs typeface="Monaco" charset="0"/>
-              </a:rPr>
-              <a:t> </a:t>
-            </a:r>
-            <a:r>
               <a:rPr lang="en-GB" sz="1300" dirty="0" err="1">
                 <a:solidFill>
                   <a:srgbClr val="006AC7"/>
@@ -7750,39 +7679,7 @@
                 <a:ea typeface="Monaco" charset="0"/>
                 <a:cs typeface="Monaco" charset="0"/>
               </a:rPr>
-              <a:t>(</a:t>
-            </a:r>
-            <a:r>
-              <a:rPr lang="en-GB" sz="1300" dirty="0" err="1">
-                <a:latin typeface="Monaco" charset="0"/>
-                <a:ea typeface="Monaco" charset="0"/>
-                <a:cs typeface="Monaco" charset="0"/>
-              </a:rPr>
-              <a:t>data_corpus_inaugural</a:t>
-            </a:r>
-            <a:r>
-              <a:rPr lang="en-GB" sz="1300" dirty="0">
-                <a:latin typeface="Monaco" charset="0"/>
-                <a:ea typeface="Monaco" charset="0"/>
-                <a:cs typeface="Monaco" charset="0"/>
-              </a:rPr>
-              <a:t>, measure = "</a:t>
-            </a:r>
-            <a:r>
-              <a:rPr lang="en-GB" sz="1300" dirty="0" err="1">
-                <a:latin typeface="Monaco" charset="0"/>
-                <a:ea typeface="Monaco" charset="0"/>
-                <a:cs typeface="Monaco" charset="0"/>
-              </a:rPr>
-              <a:t>Flesch</a:t>
-            </a:r>
-            <a:r>
-              <a:rPr lang="en-GB" sz="1300" dirty="0">
-                <a:latin typeface="Monaco" charset="0"/>
-                <a:ea typeface="Monaco" charset="0"/>
-                <a:cs typeface="Monaco" charset="0"/>
-              </a:rPr>
-              <a:t>") </a:t>
+              <a:t>(x, measure = c("Flesch", "FOG")) </a:t>
             </a:r>
           </a:p>
           <a:p>
@@ -7882,7 +7779,18 @@
                 <a:ea typeface="Monaco" charset="0"/>
                 <a:cs typeface="Monaco" charset="0"/>
               </a:rPr>
-              <a:t>(x, "2017-Trump", method = "cosine")</a:t>
+              <a:t>(x, "2017-Trump", method = "cosine", </a:t>
+            </a:r>
+          </a:p>
+          <a:p>
+            <a:pPr algn="l"/>
+            <a:r>
+              <a:rPr lang="en-GB" sz="1300" dirty="0">
+                <a:latin typeface="Monaco" charset="0"/>
+                <a:ea typeface="Monaco" charset="0"/>
+                <a:cs typeface="Monaco" charset="0"/>
+              </a:rPr>
+              <a:t>		   margin = c("documents", "features"))</a:t>
             </a:r>
             <a:endParaRPr lang="en-GB" sz="1300" i="1" dirty="0">
               <a:solidFill>
@@ -7912,7 +7820,18 @@
                 <a:ea typeface="Monaco" charset="0"/>
                 <a:cs typeface="Monaco" charset="0"/>
               </a:rPr>
-              <a:t>(x, "2017-Trump", margin = "features")</a:t>
+              <a:t>(x, "2017-Trump", </a:t>
+            </a:r>
+          </a:p>
+          <a:p>
+            <a:pPr algn="l"/>
+            <a:r>
+              <a:rPr lang="en-GB" sz="1300" dirty="0">
+                <a:latin typeface="Monaco" charset="0"/>
+                <a:ea typeface="Monaco" charset="0"/>
+                <a:cs typeface="Monaco" charset="0"/>
+              </a:rPr>
+              <a:t>		  margin = c("documents", "features"))</a:t>
             </a:r>
             <a:endParaRPr lang="en-GB" sz="1300" i="1" dirty="0">
               <a:solidFill>
@@ -7986,7 +7905,7 @@
         </p:nvSpPr>
         <p:spPr>
           <a:xfrm>
-            <a:off x="247836" y="5630971"/>
+            <a:off x="249128" y="5351834"/>
             <a:ext cx="6084291" cy="184666"/>
           </a:xfrm>
           <a:prstGeom prst="rect">
@@ -8027,7 +7946,7 @@
         </p:nvSpPr>
         <p:spPr>
           <a:xfrm>
-            <a:off x="131672" y="5023173"/>
+            <a:off x="132964" y="4744036"/>
             <a:ext cx="6436800" cy="482886"/>
           </a:xfrm>
           <a:prstGeom prst="roundRect">
@@ -8113,7 +8032,211 @@
         </p:nvSpPr>
         <p:spPr>
           <a:xfrm>
-            <a:off x="6647804" y="196471"/>
+            <a:off x="6647804" y="196470"/>
+            <a:ext cx="7253999" cy="858643"/>
+          </a:xfrm>
+          <a:prstGeom prst="roundRect">
+            <a:avLst>
+              <a:gd name="adj" fmla="val 20098"/>
+            </a:avLst>
+          </a:prstGeom>
+          <a:solidFill>
+            <a:srgbClr val="006AC7"/>
+          </a:solidFill>
+          <a:ln w="12700">
+            <a:miter lim="400000"/>
+          </a:ln>
+          <a:extLst>
+            <a:ext uri="{C572A759-6A51-4108-AA02-DFA0A04FC94B}">
+              <ma14:wrappingTextBoxFlag xmlns:ma14="http://schemas.microsoft.com/office/mac/drawingml/2011/main" xmlns="" val="1"/>
+            </a:ext>
+          </a:extLst>
+        </p:spPr>
+        <p:txBody>
+          <a:bodyPr lIns="0" tIns="0" rIns="0" bIns="0" anchor="ctr"/>
+          <a:lstStyle/>
+          <a:p>
+            <a:pPr lvl="1" indent="0">
+              <a:defRPr sz="1800"/>
+            </a:pPr>
+            <a:r>
+              <a:rPr lang="en-US" sz="2400" dirty="0">
+                <a:solidFill>
+                  <a:srgbClr val="FFFFFF"/>
+                </a:solidFill>
+                <a:latin typeface="Source Sans Pro"/>
+                <a:ea typeface="Source Sans Pro"/>
+                <a:cs typeface="Source Sans Pro"/>
+                <a:sym typeface="Source Sans Pro"/>
+              </a:rPr>
+              <a:t>Fit text models based on a </a:t>
+            </a:r>
+            <a:r>
+              <a:rPr lang="en-US" sz="2400" dirty="0" err="1">
+                <a:solidFill>
+                  <a:srgbClr val="FFFFFF"/>
+                </a:solidFill>
+                <a:latin typeface="Source Sans Pro"/>
+                <a:ea typeface="Source Sans Pro"/>
+                <a:cs typeface="Source Sans Pro"/>
+                <a:sym typeface="Source Sans Pro"/>
+              </a:rPr>
+              <a:t>dfm</a:t>
+            </a:r>
+            <a:r>
+              <a:rPr lang="en-US" sz="2400" dirty="0">
+                <a:solidFill>
+                  <a:srgbClr val="FFFFFF"/>
+                </a:solidFill>
+                <a:latin typeface="Source Sans Pro"/>
+                <a:ea typeface="Source Sans Pro"/>
+                <a:cs typeface="Source Sans Pro"/>
+                <a:sym typeface="Source Sans Pro"/>
+              </a:rPr>
+              <a:t> (</a:t>
+            </a:r>
+            <a:r>
+              <a:rPr lang="en-US" sz="2000" dirty="0" err="1">
+                <a:solidFill>
+                  <a:srgbClr val="FFFFFF"/>
+                </a:solidFill>
+                <a:latin typeface="Monaco" charset="0"/>
+                <a:ea typeface="Monaco" charset="0"/>
+                <a:cs typeface="Monaco" charset="0"/>
+                <a:sym typeface="Source Sans Pro"/>
+              </a:rPr>
+              <a:t>textmodel</a:t>
+            </a:r>
+            <a:r>
+              <a:rPr lang="en-US" sz="2000" dirty="0">
+                <a:solidFill>
+                  <a:srgbClr val="FFFFFF"/>
+                </a:solidFill>
+                <a:latin typeface="Monaco" charset="0"/>
+                <a:ea typeface="Monaco" charset="0"/>
+                <a:cs typeface="Monaco" charset="0"/>
+                <a:sym typeface="Source Sans Pro"/>
+              </a:rPr>
+              <a:t>_*</a:t>
+            </a:r>
+            <a:r>
+              <a:rPr lang="en-US" sz="2400" dirty="0">
+                <a:solidFill>
+                  <a:srgbClr val="FFFFFF"/>
+                </a:solidFill>
+                <a:latin typeface="Source Sans Pro"/>
+                <a:ea typeface="Source Sans Pro"/>
+                <a:cs typeface="Source Sans Pro"/>
+                <a:sym typeface="Source Sans Pro"/>
+              </a:rPr>
+              <a:t>)</a:t>
+            </a:r>
+          </a:p>
+          <a:p>
+            <a:pPr lvl="1" indent="0">
+              <a:defRPr sz="1800"/>
+            </a:pPr>
+            <a:r>
+              <a:rPr lang="en-US" sz="1400" i="1" dirty="0">
+                <a:solidFill>
+                  <a:srgbClr val="FFFFFF"/>
+                </a:solidFill>
+                <a:latin typeface="Source Sans Pro"/>
+                <a:ea typeface="Source Sans Pro"/>
+                <a:cs typeface="Source Sans Pro"/>
+                <a:sym typeface="Source Sans Pro"/>
+              </a:rPr>
+              <a:t>These functions require the </a:t>
+            </a:r>
+            <a:r>
+              <a:rPr lang="en-US" sz="1400" b="1" dirty="0" err="1">
+                <a:solidFill>
+                  <a:srgbClr val="FFFFFF"/>
+                </a:solidFill>
+                <a:latin typeface="Source Sans Pro"/>
+                <a:ea typeface="Source Sans Pro"/>
+                <a:cs typeface="Source Sans Pro"/>
+                <a:sym typeface="Source Sans Pro"/>
+              </a:rPr>
+              <a:t>quanteda.textmodels</a:t>
+            </a:r>
+            <a:r>
+              <a:rPr lang="en-US" sz="1400" b="1" dirty="0">
+                <a:solidFill>
+                  <a:srgbClr val="FFFFFF"/>
+                </a:solidFill>
+                <a:latin typeface="Source Sans Pro"/>
+                <a:ea typeface="Source Sans Pro"/>
+                <a:cs typeface="Source Sans Pro"/>
+                <a:sym typeface="Source Sans Pro"/>
+              </a:rPr>
+              <a:t> </a:t>
+            </a:r>
+            <a:r>
+              <a:rPr lang="en-US" sz="1400" i="1" dirty="0">
+                <a:solidFill>
+                  <a:srgbClr val="FFFFFF"/>
+                </a:solidFill>
+                <a:latin typeface="Source Sans Pro"/>
+                <a:ea typeface="Source Sans Pro"/>
+                <a:cs typeface="Source Sans Pro"/>
+                <a:sym typeface="Source Sans Pro"/>
+              </a:rPr>
+              <a:t>package</a:t>
+            </a:r>
+          </a:p>
+        </p:txBody>
+      </p:sp>
+      <p:sp>
+        <p:nvSpPr>
+          <p:cNvPr id="53" name="Shape 35"/>
+          <p:cNvSpPr/>
+          <p:nvPr/>
+        </p:nvSpPr>
+        <p:spPr>
+          <a:xfrm>
+            <a:off x="6809909" y="6487781"/>
+            <a:ext cx="6836713" cy="184666"/>
+          </a:xfrm>
+          <a:prstGeom prst="rect">
+            <a:avLst/>
+          </a:prstGeom>
+          <a:ln w="12700">
+            <a:miter lim="400000"/>
+          </a:ln>
+          <a:extLst>
+            <a:ext uri="{C572A759-6A51-4108-AA02-DFA0A04FC94B}">
+              <ma14:wrappingTextBoxFlag xmlns:ma14="http://schemas.microsoft.com/office/mac/drawingml/2011/main" xmlns="" val="1"/>
+            </a:ext>
+          </a:extLst>
+        </p:spPr>
+        <p:txBody>
+          <a:bodyPr wrap="square" lIns="0" tIns="0" rIns="0" bIns="0">
+            <a:spAutoFit/>
+          </a:bodyPr>
+          <a:lstStyle/>
+          <a:p>
+            <a:pPr algn="l"/>
+            <a:endParaRPr lang="en-GB" sz="1200" b="1" i="1">
+              <a:solidFill>
+                <a:srgbClr val="006AC7"/>
+              </a:solidFill>
+              <a:latin typeface="Source Sans Pro" charset="0"/>
+              <a:ea typeface="Source Sans Pro" charset="0"/>
+              <a:cs typeface="Source Sans Pro" charset="0"/>
+            </a:endParaRPr>
+          </a:p>
+        </p:txBody>
+      </p:sp>
+      <p:sp>
+        <p:nvSpPr>
+          <p:cNvPr id="55" name="Shape 38"/>
+          <p:cNvSpPr/>
+          <p:nvPr/>
+        </p:nvSpPr>
+        <p:spPr>
+          <a:xfrm>
+            <a:off x="6640309" y="4734386"/>
             <a:ext cx="7253999" cy="482886"/>
           </a:xfrm>
           <a:prstGeom prst="roundRect">
@@ -8150,10 +8273,34 @@
                 <a:cs typeface="Source Sans Pro"/>
                 <a:sym typeface="Source Sans Pro"/>
               </a:rPr>
-              <a:t>Fit text models based on a </a:t>
-            </a:r>
-            <a:r>
-              <a:rPr lang="en-US" sz="2400" dirty="0" err="1">
+              <a:t>Plot features or models (</a:t>
+            </a:r>
+            <a:r>
+              <a:rPr lang="en-US" sz="2000" dirty="0" err="1">
+                <a:solidFill>
+                  <a:srgbClr val="FFFFFF"/>
+                </a:solidFill>
+                <a:latin typeface="Monaco" charset="0"/>
+                <a:ea typeface="Monaco" charset="0"/>
+                <a:cs typeface="Monaco" charset="0"/>
+                <a:sym typeface="Source Sans Pro"/>
+              </a:rPr>
+              <a:t>textplot</a:t>
+            </a:r>
+            <a:r>
+              <a:rPr lang="en-US" sz="2000" dirty="0">
+                <a:solidFill>
+                  <a:srgbClr val="FFFFFF"/>
+                </a:solidFill>
+                <a:latin typeface="Monaco" charset="0"/>
+                <a:ea typeface="Monaco" charset="0"/>
+                <a:cs typeface="Monaco" charset="0"/>
+                <a:sym typeface="Source Sans Pro"/>
+              </a:rPr>
+              <a:t>_*</a:t>
+            </a:r>
+            <a:r>
+              <a:rPr lang="en-US" sz="2400" dirty="0">
                 <a:solidFill>
                   <a:srgbClr val="FFFFFF"/>
                 </a:solidFill>
@@ -8162,196 +8309,50 @@
                 <a:cs typeface="Source Sans Pro"/>
                 <a:sym typeface="Source Sans Pro"/>
               </a:rPr>
-              <a:t>dfm</a:t>
-            </a:r>
-            <a:r>
-              <a:rPr lang="en-US" sz="2400" dirty="0">
-                <a:solidFill>
-                  <a:srgbClr val="FFFFFF"/>
-                </a:solidFill>
-                <a:latin typeface="Source Sans Pro"/>
-                <a:ea typeface="Source Sans Pro"/>
-                <a:cs typeface="Source Sans Pro"/>
-                <a:sym typeface="Source Sans Pro"/>
-              </a:rPr>
-              <a:t> (</a:t>
-            </a:r>
-            <a:r>
-              <a:rPr lang="en-US" sz="2000" dirty="0" err="1">
-                <a:solidFill>
-                  <a:srgbClr val="FFFFFF"/>
-                </a:solidFill>
-                <a:latin typeface="Monaco" charset="0"/>
-                <a:ea typeface="Monaco" charset="0"/>
-                <a:cs typeface="Monaco" charset="0"/>
-                <a:sym typeface="Source Sans Pro"/>
-              </a:rPr>
-              <a:t>textmodel</a:t>
-            </a:r>
-            <a:r>
-              <a:rPr lang="en-US" sz="2000" dirty="0">
-                <a:solidFill>
-                  <a:srgbClr val="FFFFFF"/>
-                </a:solidFill>
-                <a:latin typeface="Monaco" charset="0"/>
-                <a:ea typeface="Monaco" charset="0"/>
-                <a:cs typeface="Monaco" charset="0"/>
-                <a:sym typeface="Source Sans Pro"/>
-              </a:rPr>
-              <a:t>_*</a:t>
-            </a:r>
-            <a:r>
-              <a:rPr lang="en-US" sz="2400" dirty="0">
-                <a:solidFill>
-                  <a:srgbClr val="FFFFFF"/>
-                </a:solidFill>
-                <a:latin typeface="Source Sans Pro"/>
-                <a:ea typeface="Source Sans Pro"/>
-                <a:cs typeface="Source Sans Pro"/>
-                <a:sym typeface="Source Sans Pro"/>
-              </a:rPr>
               <a:t>)</a:t>
             </a:r>
           </a:p>
         </p:txBody>
       </p:sp>
-      <p:sp>
-        <p:nvSpPr>
-          <p:cNvPr id="53" name="Shape 35"/>
-          <p:cNvSpPr/>
+      <p:pic>
+        <p:nvPicPr>
+          <p:cNvPr id="58" name="Picture 57"/>
+          <p:cNvPicPr>
+            <a:picLocks noChangeAspect="1"/>
+          </p:cNvPicPr>
           <p:nvPr/>
-        </p:nvSpPr>
+        </p:nvPicPr>
+        <p:blipFill rotWithShape="1">
+          <a:blip r:embed="rId3">
+            <a:extLst>
+              <a:ext uri="{28A0092B-C50C-407E-A947-70E740481C1C}">
+                <a14:useLocalDpi xmlns:a14="http://schemas.microsoft.com/office/drawing/2010/main" val="0"/>
+              </a:ext>
+            </a:extLst>
+          </a:blip>
+          <a:srcRect l="25138" t="26147" r="25661" b="24848"/>
+          <a:stretch/>
+        </p:blipFill>
         <p:spPr>
           <a:xfrm>
-            <a:off x="6809909" y="5417535"/>
-            <a:ext cx="6836713" cy="184666"/>
+            <a:off x="11963411" y="5208301"/>
+            <a:ext cx="1328655" cy="1323367"/>
           </a:xfrm>
           <a:prstGeom prst="rect">
             <a:avLst/>
           </a:prstGeom>
-          <a:ln w="12700">
-            <a:miter lim="400000"/>
-          </a:ln>
-          <a:extLst>
-            <a:ext uri="{C572A759-6A51-4108-AA02-DFA0A04FC94B}">
-              <ma14:wrappingTextBoxFlag xmlns:ma14="http://schemas.microsoft.com/office/mac/drawingml/2011/main" xmlns="" val="1"/>
-            </a:ext>
-          </a:extLst>
         </p:spPr>
-        <p:txBody>
-          <a:bodyPr wrap="square" lIns="0" tIns="0" rIns="0" bIns="0">
-            <a:spAutoFit/>
-          </a:bodyPr>
-          <a:lstStyle/>
-          <a:p>
-            <a:pPr algn="l"/>
-            <a:endParaRPr lang="en-GB" sz="1200" b="1" i="1">
-              <a:solidFill>
-                <a:srgbClr val="006AC7"/>
-              </a:solidFill>
-              <a:latin typeface="Source Sans Pro" charset="0"/>
-              <a:ea typeface="Source Sans Pro" charset="0"/>
-              <a:cs typeface="Source Sans Pro" charset="0"/>
-            </a:endParaRPr>
-          </a:p>
-        </p:txBody>
-      </p:sp>
-      <p:sp>
-        <p:nvSpPr>
-          <p:cNvPr id="55" name="Shape 38"/>
-          <p:cNvSpPr/>
-          <p:nvPr/>
-        </p:nvSpPr>
-        <p:spPr>
-          <a:xfrm>
-            <a:off x="6640309" y="3664140"/>
-            <a:ext cx="7253999" cy="482886"/>
-          </a:xfrm>
-          <a:prstGeom prst="roundRect">
-            <a:avLst>
-              <a:gd name="adj" fmla="val 20098"/>
-            </a:avLst>
-          </a:prstGeom>
-          <a:solidFill>
-            <a:srgbClr val="006AC7"/>
-          </a:solidFill>
-          <a:ln w="12700">
-            <a:miter lim="400000"/>
-          </a:ln>
-          <a:extLst>
-            <a:ext uri="{C572A759-6A51-4108-AA02-DFA0A04FC94B}">
-              <ma14:wrappingTextBoxFlag xmlns:ma14="http://schemas.microsoft.com/office/mac/drawingml/2011/main" xmlns="" val="1"/>
-            </a:ext>
-          </a:extLst>
-        </p:spPr>
-        <p:txBody>
-          <a:bodyPr lIns="0" tIns="0" rIns="0" bIns="0" anchor="ctr"/>
-          <a:lstStyle/>
-          <a:p>
-            <a:pPr lvl="1" indent="0">
-              <a:defRPr sz="1800"/>
-            </a:pPr>
-            <a:r>
-              <a:rPr lang="en-US" sz="2400" dirty="0">
-                <a:solidFill>
-                  <a:srgbClr val="FFFFFF"/>
-                </a:solidFill>
-                <a:latin typeface="Source Sans Pro"/>
-                <a:ea typeface="Source Sans Pro"/>
-                <a:cs typeface="Source Sans Pro"/>
-                <a:sym typeface="Source Sans Pro"/>
-              </a:rPr>
-              <a:t>Plot features or models (</a:t>
-            </a:r>
-            <a:r>
-              <a:rPr lang="en-US" sz="2000" dirty="0" err="1">
-                <a:solidFill>
-                  <a:srgbClr val="FFFFFF"/>
-                </a:solidFill>
-                <a:latin typeface="Monaco" charset="0"/>
-                <a:ea typeface="Monaco" charset="0"/>
-                <a:cs typeface="Monaco" charset="0"/>
-                <a:sym typeface="Source Sans Pro"/>
-              </a:rPr>
-              <a:t>textplot</a:t>
-            </a:r>
-            <a:r>
-              <a:rPr lang="en-US" sz="2000" dirty="0">
-                <a:solidFill>
-                  <a:srgbClr val="FFFFFF"/>
-                </a:solidFill>
-                <a:latin typeface="Monaco" charset="0"/>
-                <a:ea typeface="Monaco" charset="0"/>
-                <a:cs typeface="Monaco" charset="0"/>
-                <a:sym typeface="Source Sans Pro"/>
-              </a:rPr>
-              <a:t>_*</a:t>
-            </a:r>
-            <a:r>
-              <a:rPr lang="en-US" sz="2400" dirty="0">
-                <a:solidFill>
-                  <a:srgbClr val="FFFFFF"/>
-                </a:solidFill>
-                <a:latin typeface="Source Sans Pro"/>
-                <a:ea typeface="Source Sans Pro"/>
-                <a:cs typeface="Source Sans Pro"/>
-                <a:sym typeface="Source Sans Pro"/>
-              </a:rPr>
-              <a:t>)</a:t>
-            </a:r>
-          </a:p>
-        </p:txBody>
-      </p:sp>
+      </p:pic>
       <p:pic>
         <p:nvPicPr>
-          <p:cNvPr id="57" name="Picture 56"/>
+          <p:cNvPr id="59" name="Picture 58"/>
           <p:cNvPicPr>
             <a:picLocks noChangeAspect="1"/>
           </p:cNvPicPr>
           <p:nvPr/>
         </p:nvPicPr>
         <p:blipFill>
-          <a:blip r:embed="rId3">
+          <a:blip r:embed="rId4">
             <a:extLst>
               <a:ext uri="{28A0092B-C50C-407E-A947-70E740481C1C}">
                 <a14:useLocalDpi xmlns:a14="http://schemas.microsoft.com/office/drawing/2010/main" val="0"/>
@@ -8364,8 +8365,8 @@
         </p:blipFill>
         <p:spPr>
           <a:xfrm>
-            <a:off x="11814893" y="5436429"/>
-            <a:ext cx="1809004" cy="1356753"/>
+            <a:off x="11865450" y="6753019"/>
+            <a:ext cx="1902384" cy="1188990"/>
           </a:xfrm>
           <a:prstGeom prst="rect">
             <a:avLst/>
@@ -8374,36 +8375,7 @@
       </p:pic>
       <p:pic>
         <p:nvPicPr>
-          <p:cNvPr id="58" name="Picture 57"/>
-          <p:cNvPicPr>
-            <a:picLocks noChangeAspect="1"/>
-          </p:cNvPicPr>
-          <p:nvPr/>
-        </p:nvPicPr>
-        <p:blipFill rotWithShape="1">
-          <a:blip r:embed="rId4">
-            <a:extLst>
-              <a:ext uri="{28A0092B-C50C-407E-A947-70E740481C1C}">
-                <a14:useLocalDpi xmlns:a14="http://schemas.microsoft.com/office/drawing/2010/main" val="0"/>
-              </a:ext>
-            </a:extLst>
-          </a:blip>
-          <a:srcRect l="25138" t="26147" r="25661" b="24848"/>
-          <a:stretch/>
-        </p:blipFill>
-        <p:spPr>
-          <a:xfrm>
-            <a:off x="11963411" y="4138055"/>
-            <a:ext cx="1328655" cy="1323367"/>
-          </a:xfrm>
-          <a:prstGeom prst="rect">
-            <a:avLst/>
-          </a:prstGeom>
-        </p:spPr>
-      </p:pic>
-      <p:pic>
-        <p:nvPicPr>
-          <p:cNvPr id="59" name="Picture 58"/>
+          <p:cNvPr id="60" name="Picture 59"/>
           <p:cNvPicPr>
             <a:picLocks noChangeAspect="1"/>
           </p:cNvPicPr>
@@ -8423,37 +8395,7 @@
         </p:blipFill>
         <p:spPr>
           <a:xfrm>
-            <a:off x="11866173" y="6962611"/>
-            <a:ext cx="1902384" cy="1188990"/>
-          </a:xfrm>
-          <a:prstGeom prst="rect">
-            <a:avLst/>
-          </a:prstGeom>
-        </p:spPr>
-      </p:pic>
-      <p:pic>
-        <p:nvPicPr>
-          <p:cNvPr id="60" name="Picture 59"/>
-          <p:cNvPicPr>
-            <a:picLocks noChangeAspect="1"/>
-          </p:cNvPicPr>
-          <p:nvPr/>
-        </p:nvPicPr>
-        <p:blipFill>
-          <a:blip r:embed="rId6">
-            <a:extLst>
-              <a:ext uri="{28A0092B-C50C-407E-A947-70E740481C1C}">
-                <a14:useLocalDpi xmlns:a14="http://schemas.microsoft.com/office/drawing/2010/main" val="0"/>
-              </a:ext>
-            </a:extLst>
-          </a:blip>
-          <a:stretch>
-            <a:fillRect/>
-          </a:stretch>
-        </p:blipFill>
-        <p:spPr>
-          <a:xfrm>
-            <a:off x="11814893" y="8204846"/>
+            <a:off x="11727570" y="8106947"/>
             <a:ext cx="1800336" cy="1287657"/>
           </a:xfrm>
           <a:prstGeom prst="rect">
@@ -8469,8 +8411,8 @@
         </p:nvSpPr>
         <p:spPr>
           <a:xfrm>
-            <a:off x="273762" y="9936056"/>
-            <a:ext cx="6199029" cy="678054"/>
+            <a:off x="-211206" y="9874973"/>
+            <a:ext cx="6822465" cy="678054"/>
           </a:xfrm>
           <a:prstGeom prst="rect">
             <a:avLst/>
@@ -8548,10 +8490,10 @@
                 <a:cs typeface="Source Sans Pro" charset="0"/>
                 <a:sym typeface="Source Sans Pro Light"/>
               </a:rPr>
-              <a:t>mullers@tcd.ie</a:t>
-            </a:r>
-            <a:r>
-              <a:rPr lang="en-US" sz="1400" dirty="0">
+              <a:t>smueller@quanteda.org</a:t>
+            </a:r>
+            <a:r>
+              <a:rPr lang="en-US" sz="1400" i="1" dirty="0">
                 <a:latin typeface="Source Sans Pro" charset="0"/>
                 <a:ea typeface="Source Sans Pro" charset="0"/>
                 <a:cs typeface="Source Sans Pro" charset="0"/>
@@ -8566,14 +8508,17 @@
                 <a:cs typeface="Source Sans Pro" charset="0"/>
                 <a:sym typeface="Source Sans Pro Light"/>
               </a:rPr>
-              <a:t>kbenoit@lse.ac.uk</a:t>
-            </a:r>
-            <a:endParaRPr lang="en-US" sz="1400" i="1" dirty="0">
-              <a:latin typeface="Source Sans Pro" charset="0"/>
-              <a:ea typeface="Source Sans Pro" charset="0"/>
-              <a:cs typeface="Source Sans Pro" charset="0"/>
-              <a:sym typeface="Source Sans Pro Light"/>
-            </a:endParaRPr>
+              <a:t>kbenoit@quanteda.org</a:t>
+            </a:r>
+            <a:r>
+              <a:rPr lang="en-US" sz="1400" i="1" dirty="0">
+                <a:latin typeface="Source Sans Pro" charset="0"/>
+                <a:ea typeface="Source Sans Pro" charset="0"/>
+                <a:cs typeface="Source Sans Pro" charset="0"/>
+                <a:sym typeface="Source Sans Pro Light"/>
+              </a:rPr>
+              <a:t> </a:t>
+            </a:r>
           </a:p>
           <a:p>
             <a:pPr lvl="0" algn="r">
@@ -8681,16 +8626,7 @@
                 <a:cs typeface="Source Sans Pro" charset="0"/>
                 <a:sym typeface="Source Sans Pro Light"/>
               </a:rPr>
-              <a:t>•  updated</a:t>
-            </a:r>
-            <a:r>
-              <a:rPr lang="en-US" sz="1400">
-                <a:latin typeface="Source Sans Pro" charset="0"/>
-                <a:ea typeface="Source Sans Pro" charset="0"/>
-                <a:cs typeface="Source Sans Pro" charset="0"/>
-                <a:sym typeface="Source Sans Pro Light"/>
-              </a:rPr>
-              <a:t>: 11/18</a:t>
+              <a:t>•  updated: 05/2020</a:t>
             </a:r>
             <a:endParaRPr lang="en-US" sz="1400" dirty="0">
               <a:solidFill>
@@ -8852,7 +8788,7 @@
                 <a:ea typeface="Monaco" charset="0"/>
                 <a:cs typeface="Monaco" charset="0"/>
               </a:rPr>
-              <a:t> = TRUE, stem = TRUE)</a:t>
+              <a:t> = TRUE)</a:t>
             </a:r>
             <a:endParaRPr lang="en-GB" sz="1300" dirty="0">
               <a:solidFill>
@@ -8976,54 +8912,6 @@
                 <a:ea typeface="Monaco" charset="0"/>
                 <a:cs typeface="Monaco" charset="0"/>
               </a:rPr>
-              <a:t>powerful", </a:t>
-            </a:r>
-            <a:r>
-              <a:rPr lang="en-GB" sz="1300" dirty="0">
-                <a:latin typeface="Monaco" charset="0"/>
-                <a:ea typeface="Monaco" charset="0"/>
-                <a:cs typeface="Monaco" charset="0"/>
-              </a:rPr>
-              <a:t>"</a:t>
-            </a:r>
-            <a:r>
-              <a:rPr lang="en-GB" sz="1300" dirty="0">
-                <a:solidFill>
-                  <a:schemeClr val="tx1"/>
-                </a:solidFill>
-                <a:uFill>
-                  <a:solidFill>
-                    <a:schemeClr val="bg1"/>
-                  </a:solidFill>
-                </a:uFill>
-                <a:latin typeface="Monaco" charset="0"/>
-                <a:ea typeface="Monaco" charset="0"/>
-                <a:cs typeface="Monaco" charset="0"/>
-              </a:rPr>
-              <a:t>tool", </a:t>
-            </a:r>
-            <a:r>
-              <a:rPr lang="en-GB" sz="1300" dirty="0">
-                <a:latin typeface="Monaco" charset="0"/>
-                <a:ea typeface="Monaco" charset="0"/>
-                <a:cs typeface="Monaco" charset="0"/>
-              </a:rPr>
-              <a:t>"</a:t>
-            </a:r>
-            <a:r>
-              <a:rPr lang="en-GB" sz="1300" dirty="0">
-                <a:solidFill>
-                  <a:schemeClr val="tx1"/>
-                </a:solidFill>
-                <a:uFill>
-                  <a:solidFill>
-                    <a:schemeClr val="bg1"/>
-                  </a:solidFill>
-                </a:uFill>
-                <a:latin typeface="Monaco" charset="0"/>
-                <a:ea typeface="Monaco" charset="0"/>
-                <a:cs typeface="Monaco" charset="0"/>
-              </a:rPr>
               <a:t>text analysis"))</a:t>
             </a:r>
           </a:p>
@@ -9275,20 +9163,49 @@
                 <a:ea typeface="Monaco" charset="0"/>
                 <a:cs typeface="Monaco" charset="0"/>
               </a:rPr>
-              <a:t>(</a:t>
-            </a:r>
-            <a:r>
-              <a:rPr lang="en-GB" sz="1400" dirty="0" err="1">
+              <a:t>(x, n = 2, skip = 0:1) </a:t>
+            </a:r>
+          </a:p>
+          <a:p>
+            <a:pPr algn="l">
+              <a:spcBef>
+                <a:spcPts val="800"/>
+              </a:spcBef>
+            </a:pPr>
+            <a:r>
+              <a:rPr lang="en-GB" sz="1500" b="1" dirty="0">
+                <a:solidFill>
+                  <a:schemeClr val="tx1"/>
+                </a:solidFill>
                 <a:uFill>
                   <a:solidFill>
                     <a:schemeClr val="bg1"/>
                   </a:solidFill>
                 </a:uFill>
-                <a:latin typeface="Monaco" charset="0"/>
-                <a:ea typeface="Monaco" charset="0"/>
-                <a:cs typeface="Monaco" charset="0"/>
-              </a:rPr>
-              <a:t>toks</a:t>
+                <a:latin typeface="Source Sans Pro" charset="0"/>
+                <a:ea typeface="Source Sans Pro" charset="0"/>
+                <a:cs typeface="Source Sans Pro" charset="0"/>
+              </a:rPr>
+              <a:t>Convert case of tokens or features</a:t>
+            </a:r>
+          </a:p>
+          <a:p>
+            <a:pPr algn="l"/>
+            <a:r>
+              <a:rPr lang="en-GB" sz="1400" dirty="0" err="1">
+                <a:solidFill>
+                  <a:srgbClr val="006AC7"/>
+                </a:solidFill>
+                <a:uFill>
+                  <a:solidFill>
+                    <a:schemeClr val="bg1"/>
+                  </a:solidFill>
+                </a:uFill>
+                <a:latin typeface="Monaco" charset="0"/>
+                <a:ea typeface="Monaco" charset="0"/>
+                <a:cs typeface="Monaco" charset="0"/>
+              </a:rPr>
+              <a:t>tokens_tolower</a:t>
             </a:r>
             <a:r>
               <a:rPr lang="en-GB" sz="1400" dirty="0">
@@ -9301,49 +9218,23 @@
                 <a:ea typeface="Monaco" charset="0"/>
                 <a:cs typeface="Monaco" charset="0"/>
               </a:rPr>
-              <a:t>, n = 2, skip = 0:1) </a:t>
-            </a:r>
-          </a:p>
-          <a:p>
-            <a:pPr algn="l">
-              <a:spcBef>
-                <a:spcPts val="800"/>
-              </a:spcBef>
-            </a:pPr>
-            <a:r>
-              <a:rPr lang="en-GB" sz="1500" b="1" dirty="0">
-                <a:solidFill>
-                  <a:schemeClr val="tx1"/>
+              <a:t>(x) </a:t>
+            </a:r>
+            <a:r>
+              <a:rPr lang="en-GB" sz="1400" dirty="0" err="1">
+                <a:solidFill>
+                  <a:srgbClr val="006AC7"/>
                 </a:solidFill>
                 <a:uFill>
                   <a:solidFill>
                     <a:schemeClr val="bg1"/>
                   </a:solidFill>
                 </a:uFill>
-                <a:latin typeface="Source Sans Pro" charset="0"/>
-                <a:ea typeface="Source Sans Pro" charset="0"/>
-                <a:cs typeface="Source Sans Pro" charset="0"/>
-              </a:rPr>
-              <a:t>Convert case of tokens</a:t>
-            </a:r>
-          </a:p>
-          <a:p>
-            <a:pPr algn="l"/>
-            <a:r>
-              <a:rPr lang="en-GB" sz="1400" dirty="0" err="1">
-                <a:solidFill>
-                  <a:srgbClr val="006AC7"/>
-                </a:solidFill>
-                <a:uFill>
-                  <a:solidFill>
-                    <a:schemeClr val="bg1"/>
-                  </a:solidFill>
-                </a:uFill>
-                <a:latin typeface="Monaco" charset="0"/>
-                <a:ea typeface="Monaco" charset="0"/>
-                <a:cs typeface="Monaco" charset="0"/>
-              </a:rPr>
-              <a:t>tokens_tolower</a:t>
+                <a:latin typeface="Monaco" charset="0"/>
+                <a:ea typeface="Monaco" charset="0"/>
+                <a:cs typeface="Monaco" charset="0"/>
+              </a:rPr>
+              <a:t>tokens_toupper</a:t>
             </a:r>
             <a:r>
               <a:rPr lang="en-GB" sz="1400" dirty="0">
@@ -9356,7 +9247,7 @@
                 <a:ea typeface="Monaco" charset="0"/>
                 <a:cs typeface="Monaco" charset="0"/>
               </a:rPr>
-              <a:t>(x) | </a:t>
+              <a:t>(x) </a:t>
             </a:r>
             <a:r>
               <a:rPr lang="en-GB" sz="1400" dirty="0" err="1">
@@ -9369,10 +9260,8 @@
                   </a:solidFill>
                 </a:uFill>
                 <a:latin typeface="Monaco" charset="0"/>
-                <a:ea typeface="Monaco" charset="0"/>
-                <a:cs typeface="Monaco" charset="0"/>
-              </a:rPr>
-              <a:t>tokens_topupper</a:t>
+              </a:rPr>
+              <a:t>dfm_tolower</a:t>
             </a:r>
             <a:r>
               <a:rPr lang="en-GB" sz="1400" dirty="0">
@@ -9408,7 +9297,7 @@
                 <a:ea typeface="Source Sans Pro" charset="0"/>
                 <a:cs typeface="Source Sans Pro" charset="0"/>
               </a:rPr>
-              <a:t>Stem the terms in an object</a:t>
+              <a:t>Stem tokens or features</a:t>
             </a:r>
           </a:p>
           <a:p>
@@ -9428,6 +9317,33 @@
                 <a:cs typeface="Monaco" charset="0"/>
               </a:rPr>
               <a:t>tokens_wordstem</a:t>
+            </a:r>
+            <a:r>
+              <a:rPr lang="en-GB" sz="1400" dirty="0">
+                <a:uFill>
+                  <a:solidFill>
+                    <a:schemeClr val="bg1"/>
+                  </a:solidFill>
+                </a:uFill>
+                <a:latin typeface="Monaco" charset="0"/>
+                <a:ea typeface="Monaco" charset="0"/>
+                <a:cs typeface="Monaco" charset="0"/>
+              </a:rPr>
+              <a:t>(x) </a:t>
+            </a:r>
+            <a:r>
+              <a:rPr lang="en-GB" sz="1400" dirty="0" err="1">
+                <a:solidFill>
+                  <a:srgbClr val="006AC7"/>
+                </a:solidFill>
+                <a:uFill>
+                  <a:solidFill>
+                    <a:schemeClr val="bg1"/>
+                  </a:solidFill>
+                </a:uFill>
+                <a:latin typeface="Monaco" charset="0"/>
+              </a:rPr>
+              <a:t>dfm_wordstem</a:t>
             </a:r>
             <a:r>
               <a:rPr lang="en-GB" sz="1400" dirty="0">
@@ -9494,7 +9410,7 @@
         </p:nvSpPr>
         <p:spPr>
           <a:xfrm>
-            <a:off x="129877" y="204065"/>
+            <a:off x="133549" y="204065"/>
             <a:ext cx="6436800" cy="482886"/>
           </a:xfrm>
           <a:prstGeom prst="roundRect">
@@ -9777,7 +9693,7 @@
                 <a:ea typeface="Monaco" charset="0"/>
                 <a:cs typeface="Monaco" charset="0"/>
               </a:rPr>
-              <a:t>))</a:t>
+              <a:t>"))</a:t>
             </a:r>
             <a:endParaRPr lang="en-GB" sz="1300" dirty="0">
               <a:latin typeface="Monaco" charset="0"/>

</xml_diff>